<commit_message>
Hello world micro service
</commit_message>
<xml_diff>
--- a/GoMicroUvod.pptx
+++ b/GoMicroUvod.pptx
@@ -23,6 +23,9 @@
     <p:sldId id="265" r:id="rId16"/>
     <p:sldId id="266" r:id="rId17"/>
     <p:sldId id="267" r:id="rId18"/>
+    <p:sldId id="268" r:id="rId19"/>
+    <p:sldId id="269" r:id="rId20"/>
+    <p:sldId id="270" r:id="rId21"/>
   </p:sldIdLst>
   <p:sldSz cx="10077450" cy="7562850"/>
   <p:notesSz cx="7772400" cy="10058400"/>
@@ -253,7 +256,7 @@
           </a:bodyPr>
           <a:p>
             <a:pPr algn="r"/>
-            <a:fld id="{957FF0D0-A2EC-4E73-A649-7D7A359EDE49}" type="slidenum">
+            <a:fld id="{935D693C-E900-4370-AE16-FACBD981AF2F}" type="slidenum">
               <a:rPr b="0" lang="en-US" sz="1400" spc="-1" strike="noStrike">
                 <a:latin typeface="Times New Roman"/>
               </a:rPr>
@@ -269,6 +272,288 @@
   </p:cSld>
   <p:clrMap bg1="lt1" bg2="lt2" tx1="dk1" tx2="dk2" accent1="accent1" accent2="accent2" accent3="accent3" accent4="accent4" accent5="accent5" accent6="accent6" hlink="hlink" folHlink="folHlink"/>
 </p:notesMaster>
+</file>
+
+<file path=ppt/notesSlides/notesSlide12.xml><?xml version="1.0" encoding="utf-8"?>
+<p:notes xmlns:a="http://schemas.openxmlformats.org/drawingml/2006/main" xmlns:p="http://schemas.openxmlformats.org/presentationml/2006/main" xmlns:r="http://schemas.openxmlformats.org/officeDocument/2006/relationships" xmlns:p14="http://schemas.microsoft.com/office/powerpoint/2010/main" xmlns:p15="http://schemas.microsoft.com/office/powerpoint/2012/main" xmlns:mc="http://schemas.openxmlformats.org/markup-compatibility/2006">
+  <p:cSld>
+    <p:spTree>
+      <p:nvGrpSpPr>
+        <p:cNvPr id="1" name=""/>
+        <p:cNvGrpSpPr/>
+        <p:nvPr/>
+      </p:nvGrpSpPr>
+      <p:grpSpPr>
+        <a:xfrm>
+          <a:off x="0" y="0"/>
+          <a:ext cx="0" cy="0"/>
+          <a:chOff x="0" y="0"/>
+          <a:chExt cx="0" cy="0"/>
+        </a:xfrm>
+      </p:grpSpPr>
+      <p:sp>
+        <p:nvSpPr>
+          <p:cNvPr id="199" name="PlaceHolder 1"/>
+          <p:cNvSpPr>
+            <a:spLocks noGrp="1"/>
+          </p:cNvSpPr>
+          <p:nvPr>
+            <p:ph type="sldImg"/>
+          </p:nvPr>
+        </p:nvSpPr>
+        <p:spPr>
+          <a:xfrm>
+            <a:off x="1373400" y="764280"/>
+            <a:ext cx="5025240" cy="3771360"/>
+          </a:xfrm>
+          <a:prstGeom prst="rect">
+            <a:avLst/>
+          </a:prstGeom>
+        </p:spPr>
+      </p:sp>
+      <p:sp>
+        <p:nvSpPr>
+          <p:cNvPr id="200" name="PlaceHolder 2"/>
+          <p:cNvSpPr>
+            <a:spLocks noGrp="1"/>
+          </p:cNvSpPr>
+          <p:nvPr>
+            <p:ph type="body"/>
+          </p:nvPr>
+        </p:nvSpPr>
+        <p:spPr>
+          <a:xfrm>
+            <a:off x="777240" y="4777560"/>
+            <a:ext cx="6217560" cy="4525920"/>
+          </a:xfrm>
+          <a:prstGeom prst="rect">
+            <a:avLst/>
+          </a:prstGeom>
+        </p:spPr>
+        <p:txBody>
+          <a:bodyPr lIns="0" rIns="0" tIns="0" bIns="0">
+            <a:noAutofit/>
+          </a:bodyPr>
+          <a:p>
+            <a:r>
+              <a:rPr b="0" lang="en-US" sz="2000" spc="-1" strike="noStrike">
+                <a:latin typeface="Arial"/>
+              </a:rPr>
+              <a:t>micro new hello --namespace=com.foo –gopath=false</a:t>
+            </a:r>
+            <a:endParaRPr b="0" lang="en-US" sz="2000" spc="-1" strike="noStrike">
+              <a:latin typeface="Arial"/>
+            </a:endParaRPr>
+          </a:p>
+          <a:p>
+            <a:r>
+              <a:rPr b="0" lang="en-US" sz="2000" spc="-1" strike="noStrike">
+                <a:latin typeface="Arial"/>
+              </a:rPr>
+              <a:t>protoc  --go_out=. --micro_out=. protofajl</a:t>
+            </a:r>
+            <a:endParaRPr b="0" lang="en-US" sz="2000" spc="-1" strike="noStrike">
+              <a:latin typeface="Arial"/>
+            </a:endParaRPr>
+          </a:p>
+          <a:p>
+            <a:endParaRPr b="0" lang="en-US" sz="2000" spc="-1" strike="noStrike">
+              <a:latin typeface="Arial"/>
+            </a:endParaRPr>
+          </a:p>
+        </p:txBody>
+      </p:sp>
+    </p:spTree>
+  </p:cSld>
+</p:notes>
+</file>
+
+<file path=ppt/notesSlides/notesSlide13.xml><?xml version="1.0" encoding="utf-8"?>
+<p:notes xmlns:a="http://schemas.openxmlformats.org/drawingml/2006/main" xmlns:p="http://schemas.openxmlformats.org/presentationml/2006/main" xmlns:r="http://schemas.openxmlformats.org/officeDocument/2006/relationships" xmlns:p14="http://schemas.microsoft.com/office/powerpoint/2010/main" xmlns:p15="http://schemas.microsoft.com/office/powerpoint/2012/main" xmlns:mc="http://schemas.openxmlformats.org/markup-compatibility/2006">
+  <p:cSld>
+    <p:spTree>
+      <p:nvGrpSpPr>
+        <p:cNvPr id="1" name=""/>
+        <p:cNvGrpSpPr/>
+        <p:nvPr/>
+      </p:nvGrpSpPr>
+      <p:grpSpPr>
+        <a:xfrm>
+          <a:off x="0" y="0"/>
+          <a:ext cx="0" cy="0"/>
+          <a:chOff x="0" y="0"/>
+          <a:chExt cx="0" cy="0"/>
+        </a:xfrm>
+      </p:grpSpPr>
+      <p:sp>
+        <p:nvSpPr>
+          <p:cNvPr id="201" name="PlaceHolder 1"/>
+          <p:cNvSpPr>
+            <a:spLocks noGrp="1"/>
+          </p:cNvSpPr>
+          <p:nvPr>
+            <p:ph type="sldImg"/>
+          </p:nvPr>
+        </p:nvSpPr>
+        <p:spPr>
+          <a:xfrm>
+            <a:off x="1373400" y="764280"/>
+            <a:ext cx="5025240" cy="3771360"/>
+          </a:xfrm>
+          <a:prstGeom prst="rect">
+            <a:avLst/>
+          </a:prstGeom>
+        </p:spPr>
+      </p:sp>
+      <p:sp>
+        <p:nvSpPr>
+          <p:cNvPr id="202" name="PlaceHolder 2"/>
+          <p:cNvSpPr>
+            <a:spLocks noGrp="1"/>
+          </p:cNvSpPr>
+          <p:nvPr>
+            <p:ph type="body"/>
+          </p:nvPr>
+        </p:nvSpPr>
+        <p:spPr>
+          <a:xfrm>
+            <a:off x="777240" y="4777560"/>
+            <a:ext cx="6217560" cy="4525920"/>
+          </a:xfrm>
+          <a:prstGeom prst="rect">
+            <a:avLst/>
+          </a:prstGeom>
+        </p:spPr>
+        <p:txBody>
+          <a:bodyPr lIns="0" rIns="0" tIns="0" bIns="0">
+            <a:noAutofit/>
+          </a:bodyPr>
+          <a:p>
+            <a:r>
+              <a:rPr b="0" lang="en-US" sz="2000" spc="-1" strike="noStrike">
+                <a:latin typeface="Arial"/>
+              </a:rPr>
+              <a:t>Name – daje ime servisa</a:t>
+            </a:r>
+            <a:endParaRPr b="0" lang="en-US" sz="2000" spc="-1" strike="noStrike">
+              <a:latin typeface="Arial"/>
+            </a:endParaRPr>
+          </a:p>
+          <a:p>
+            <a:r>
+              <a:rPr b="0" lang="en-US" sz="2000" spc="-1" strike="noStrike">
+                <a:latin typeface="Arial"/>
+              </a:rPr>
+              <a:t>Address – adresa servisa (localhost–default)</a:t>
+            </a:r>
+            <a:endParaRPr b="0" lang="en-US" sz="2000" spc="-1" strike="noStrike">
+              <a:latin typeface="Arial"/>
+            </a:endParaRPr>
+          </a:p>
+          <a:p>
+            <a:r>
+              <a:rPr b="0" lang="en-US" sz="2000" spc="-1" strike="noStrike">
+                <a:latin typeface="Arial"/>
+              </a:rPr>
+              <a:t>RegistarIntevear- vreme obnavljanja statusa u registry</a:t>
+            </a:r>
+            <a:endParaRPr b="0" lang="en-US" sz="2000" spc="-1" strike="noStrike">
+              <a:latin typeface="Arial"/>
+            </a:endParaRPr>
+          </a:p>
+          <a:p>
+            <a:r>
+              <a:rPr b="0" lang="en-US" sz="2000" spc="-1" strike="noStrike">
+                <a:latin typeface="Arial"/>
+              </a:rPr>
+              <a:t>Wrap – kontrolise ponasanje X, moze da bude u vise nivoa gde ide od spolja ka unutra</a:t>
+            </a:r>
+            <a:endParaRPr b="0" lang="en-US" sz="2000" spc="-1" strike="noStrike">
+              <a:latin typeface="Arial"/>
+            </a:endParaRPr>
+          </a:p>
+          <a:p>
+            <a:r>
+              <a:rPr b="0" lang="en-US" sz="2000" spc="-1" strike="noStrike">
+                <a:latin typeface="Arial"/>
+              </a:rPr>
+              <a:t>Action – za command line flegove</a:t>
+            </a:r>
+            <a:endParaRPr b="0" lang="en-US" sz="2000" spc="-1" strike="noStrike">
+              <a:latin typeface="Arial"/>
+            </a:endParaRPr>
+          </a:p>
+          <a:p>
+            <a:r>
+              <a:rPr b="0" lang="en-US" sz="2000" spc="-1" strike="noStrike">
+                <a:latin typeface="Arial"/>
+              </a:rPr>
+              <a:t>Transport – specifra nacin transportovajna</a:t>
+            </a:r>
+            <a:endParaRPr b="0" lang="en-US" sz="2000" spc="-1" strike="noStrike">
+              <a:latin typeface="Arial"/>
+            </a:endParaRPr>
+          </a:p>
+          <a:p>
+            <a:r>
+              <a:rPr b="0" lang="en-US" sz="2000" spc="-1" strike="noStrike">
+                <a:latin typeface="Arial"/>
+              </a:rPr>
+              <a:t>Selector – specifra selctor</a:t>
+            </a:r>
+            <a:endParaRPr b="0" lang="en-US" sz="2000" spc="-1" strike="noStrike">
+              <a:latin typeface="Arial"/>
+            </a:endParaRPr>
+          </a:p>
+          <a:p>
+            <a:r>
+              <a:rPr b="0" lang="en-US" sz="2000" spc="-1" strike="noStrike">
+                <a:latin typeface="Arial"/>
+              </a:rPr>
+              <a:t>Registry – specifira registry koji se koristi</a:t>
+            </a:r>
+            <a:endParaRPr b="0" lang="en-US" sz="2000" spc="-1" strike="noStrike">
+              <a:latin typeface="Arial"/>
+            </a:endParaRPr>
+          </a:p>
+          <a:p>
+            <a:r>
+              <a:rPr b="0" lang="en-US" sz="2000" spc="-1" strike="noStrike">
+                <a:latin typeface="Arial"/>
+              </a:rPr>
+              <a:t>Server – defoltno je rpcServer</a:t>
+            </a:r>
+            <a:endParaRPr b="0" lang="en-US" sz="2000" spc="-1" strike="noStrike">
+              <a:latin typeface="Arial"/>
+            </a:endParaRPr>
+          </a:p>
+          <a:p>
+            <a:r>
+              <a:rPr b="0" lang="en-US" sz="2000" spc="-1" strike="noStrike">
+                <a:latin typeface="Arial"/>
+              </a:rPr>
+              <a:t>Profile – za debagiranje</a:t>
+            </a:r>
+            <a:endParaRPr b="0" lang="en-US" sz="2000" spc="-1" strike="noStrike">
+              <a:latin typeface="Arial"/>
+            </a:endParaRPr>
+          </a:p>
+          <a:p>
+            <a:r>
+              <a:rPr b="0" lang="en-US" sz="2000" spc="-1" strike="noStrike">
+                <a:latin typeface="Arial"/>
+              </a:rPr>
+              <a:t> </a:t>
+            </a:r>
+            <a:endParaRPr b="0" lang="en-US" sz="2000" spc="-1" strike="noStrike">
+              <a:latin typeface="Arial"/>
+            </a:endParaRPr>
+          </a:p>
+        </p:txBody>
+      </p:sp>
+    </p:spTree>
+  </p:cSld>
+</p:notes>
 </file>
 
 <file path=ppt/notesSlides/notesSlide3.xml><?xml version="1.0" encoding="utf-8"?>
@@ -290,7 +575,7 @@
       </p:grpSpPr>
       <p:sp>
         <p:nvSpPr>
-          <p:cNvPr id="183" name="PlaceHolder 1"/>
+          <p:cNvPr id="193" name="PlaceHolder 1"/>
           <p:cNvSpPr>
             <a:spLocks noGrp="1"/>
           </p:cNvSpPr>
@@ -301,16 +586,16 @@
         <p:spPr>
           <a:xfrm>
             <a:off x="1371600" y="764280"/>
-            <a:ext cx="5026680" cy="3769560"/>
-          </a:xfrm>
-          <a:prstGeom prst="rect">
-            <a:avLst/>
-          </a:prstGeom>
-        </p:spPr>
-      </p:sp>
-      <p:sp>
-        <p:nvSpPr>
-          <p:cNvPr id="184" name="PlaceHolder 2"/>
+            <a:ext cx="5026320" cy="3769200"/>
+          </a:xfrm>
+          <a:prstGeom prst="rect">
+            <a:avLst/>
+          </a:prstGeom>
+        </p:spPr>
+      </p:sp>
+      <p:sp>
+        <p:nvSpPr>
+          <p:cNvPr id="194" name="PlaceHolder 2"/>
           <p:cNvSpPr>
             <a:spLocks noGrp="1"/>
           </p:cNvSpPr>
@@ -321,7 +606,7 @@
         <p:spPr>
           <a:xfrm>
             <a:off x="777240" y="4603320"/>
-            <a:ext cx="6215760" cy="5636160"/>
+            <a:ext cx="6215400" cy="5635800"/>
           </a:xfrm>
           <a:prstGeom prst="rect">
             <a:avLst/>
@@ -332,7 +617,7 @@
             <a:noAutofit/>
           </a:bodyPr>
           <a:p>
-            <a:pPr marL="216000" indent="-214560">
+            <a:pPr marL="216000" indent="-214200">
               <a:lnSpc>
                 <a:spcPct val="100000"/>
               </a:lnSpc>
@@ -348,7 +633,7 @@
             </a:endParaRPr>
           </a:p>
           <a:p>
-            <a:pPr marL="216000" indent="-214560">
+            <a:pPr marL="216000" indent="-214200">
               <a:lnSpc>
                 <a:spcPct val="100000"/>
               </a:lnSpc>
@@ -364,7 +649,7 @@
             </a:endParaRPr>
           </a:p>
           <a:p>
-            <a:pPr marL="216000" indent="-214560">
+            <a:pPr marL="216000" indent="-214200">
               <a:lnSpc>
                 <a:spcPct val="100000"/>
               </a:lnSpc>
@@ -380,7 +665,7 @@
             </a:endParaRPr>
           </a:p>
           <a:p>
-            <a:pPr marL="216000" indent="-214560">
+            <a:pPr marL="216000" indent="-214200">
               <a:lnSpc>
                 <a:spcPct val="100000"/>
               </a:lnSpc>
@@ -396,7 +681,7 @@
             </a:endParaRPr>
           </a:p>
           <a:p>
-            <a:pPr marL="216000" indent="-214560">
+            <a:pPr marL="216000" indent="-214200">
               <a:lnSpc>
                 <a:spcPct val="100000"/>
               </a:lnSpc>
@@ -412,7 +697,7 @@
             </a:endParaRPr>
           </a:p>
           <a:p>
-            <a:pPr marL="216000" indent="-214560">
+            <a:pPr marL="216000" indent="-214200">
               <a:lnSpc>
                 <a:spcPct val="100000"/>
               </a:lnSpc>
@@ -428,7 +713,7 @@
             </a:endParaRPr>
           </a:p>
           <a:p>
-            <a:pPr marL="216000" indent="-214560">
+            <a:pPr marL="216000" indent="-214200">
               <a:lnSpc>
                 <a:spcPct val="100000"/>
               </a:lnSpc>
@@ -444,7 +729,7 @@
             </a:endParaRPr>
           </a:p>
           <a:p>
-            <a:pPr marL="216000" indent="-214560">
+            <a:pPr marL="216000" indent="-214200">
               <a:lnSpc>
                 <a:spcPct val="100000"/>
               </a:lnSpc>
@@ -485,7 +770,7 @@
       </p:grpSpPr>
       <p:sp>
         <p:nvSpPr>
-          <p:cNvPr id="185" name="PlaceHolder 1"/>
+          <p:cNvPr id="195" name="PlaceHolder 1"/>
           <p:cNvSpPr>
             <a:spLocks noGrp="1"/>
           </p:cNvSpPr>
@@ -496,16 +781,16 @@
         <p:spPr>
           <a:xfrm>
             <a:off x="1371600" y="764280"/>
-            <a:ext cx="5026680" cy="3769560"/>
-          </a:xfrm>
-          <a:prstGeom prst="rect">
-            <a:avLst/>
-          </a:prstGeom>
-        </p:spPr>
-      </p:sp>
-      <p:sp>
-        <p:nvSpPr>
-          <p:cNvPr id="186" name="PlaceHolder 2"/>
+            <a:ext cx="5026320" cy="3769200"/>
+          </a:xfrm>
+          <a:prstGeom prst="rect">
+            <a:avLst/>
+          </a:prstGeom>
+        </p:spPr>
+      </p:sp>
+      <p:sp>
+        <p:nvSpPr>
+          <p:cNvPr id="196" name="PlaceHolder 2"/>
           <p:cNvSpPr>
             <a:spLocks noGrp="1"/>
           </p:cNvSpPr>
@@ -516,7 +801,7 @@
         <p:spPr>
           <a:xfrm>
             <a:off x="777240" y="4777560"/>
-            <a:ext cx="6215760" cy="4524120"/>
+            <a:ext cx="6215400" cy="4523760"/>
           </a:xfrm>
           <a:prstGeom prst="rect">
             <a:avLst/>
@@ -527,7 +812,7 @@
             <a:noAutofit/>
           </a:bodyPr>
           <a:p>
-            <a:pPr marL="216000" indent="-214560">
+            <a:pPr marL="216000" indent="-214200">
               <a:lnSpc>
                 <a:spcPct val="100000"/>
               </a:lnSpc>
@@ -543,7 +828,7 @@
             </a:endParaRPr>
           </a:p>
           <a:p>
-            <a:pPr marL="216000" indent="-214560">
+            <a:pPr marL="216000" indent="-214200">
               <a:lnSpc>
                 <a:spcPct val="100000"/>
               </a:lnSpc>
@@ -559,7 +844,7 @@
             </a:endParaRPr>
           </a:p>
           <a:p>
-            <a:pPr marL="216000" indent="-214560">
+            <a:pPr marL="216000" indent="-214200">
               <a:lnSpc>
                 <a:spcPct val="100000"/>
               </a:lnSpc>
@@ -575,7 +860,7 @@
             </a:endParaRPr>
           </a:p>
           <a:p>
-            <a:pPr marL="216000" indent="-214560">
+            <a:pPr marL="216000" indent="-214200">
               <a:lnSpc>
                 <a:spcPct val="100000"/>
               </a:lnSpc>
@@ -591,7 +876,7 @@
             </a:endParaRPr>
           </a:p>
           <a:p>
-            <a:pPr marL="216000" indent="-214560">
+            <a:pPr marL="216000" indent="-214200">
               <a:lnSpc>
                 <a:spcPct val="100000"/>
               </a:lnSpc>
@@ -607,7 +892,7 @@
             </a:endParaRPr>
           </a:p>
           <a:p>
-            <a:pPr marL="216000" indent="-214560">
+            <a:pPr marL="216000" indent="-214200">
               <a:lnSpc>
                 <a:spcPct val="100000"/>
               </a:lnSpc>
@@ -623,7 +908,7 @@
             </a:endParaRPr>
           </a:p>
           <a:p>
-            <a:pPr marL="216000" indent="-214560">
+            <a:pPr marL="216000" indent="-214200">
               <a:lnSpc>
                 <a:spcPct val="100000"/>
               </a:lnSpc>
@@ -639,7 +924,7 @@
             </a:endParaRPr>
           </a:p>
           <a:p>
-            <a:pPr marL="216000" indent="-214560">
+            <a:pPr marL="216000" indent="-214200">
               <a:lnSpc>
                 <a:spcPct val="100000"/>
               </a:lnSpc>
@@ -655,7 +940,7 @@
             </a:endParaRPr>
           </a:p>
           <a:p>
-            <a:pPr marL="216000" indent="-214560">
+            <a:pPr marL="216000" indent="-214200">
               <a:lnSpc>
                 <a:spcPct val="100000"/>
               </a:lnSpc>
@@ -665,7 +950,7 @@
             </a:endParaRPr>
           </a:p>
           <a:p>
-            <a:pPr marL="216000" indent="-214560">
+            <a:pPr marL="216000" indent="-214200">
               <a:lnSpc>
                 <a:spcPct val="100000"/>
               </a:lnSpc>
@@ -681,7 +966,7 @@
             </a:endParaRPr>
           </a:p>
           <a:p>
-            <a:pPr marL="216000" indent="-214560">
+            <a:pPr marL="216000" indent="-214200">
               <a:lnSpc>
                 <a:spcPct val="100000"/>
               </a:lnSpc>
@@ -716,7 +1001,7 @@
       </p:grpSpPr>
       <p:sp>
         <p:nvSpPr>
-          <p:cNvPr id="187" name="PlaceHolder 1"/>
+          <p:cNvPr id="197" name="PlaceHolder 1"/>
           <p:cNvSpPr>
             <a:spLocks noGrp="1"/>
           </p:cNvSpPr>
@@ -727,16 +1012,16 @@
         <p:spPr>
           <a:xfrm>
             <a:off x="1371600" y="764280"/>
-            <a:ext cx="5026680" cy="3769560"/>
-          </a:xfrm>
-          <a:prstGeom prst="rect">
-            <a:avLst/>
-          </a:prstGeom>
-        </p:spPr>
-      </p:sp>
-      <p:sp>
-        <p:nvSpPr>
-          <p:cNvPr id="188" name="PlaceHolder 2"/>
+            <a:ext cx="5026320" cy="3769200"/>
+          </a:xfrm>
+          <a:prstGeom prst="rect">
+            <a:avLst/>
+          </a:prstGeom>
+        </p:spPr>
+      </p:sp>
+      <p:sp>
+        <p:nvSpPr>
+          <p:cNvPr id="198" name="PlaceHolder 2"/>
           <p:cNvSpPr>
             <a:spLocks noGrp="1"/>
           </p:cNvSpPr>
@@ -747,7 +1032,7 @@
         <p:spPr>
           <a:xfrm>
             <a:off x="777240" y="4777560"/>
-            <a:ext cx="6215760" cy="4524120"/>
+            <a:ext cx="6215400" cy="4523760"/>
           </a:xfrm>
           <a:prstGeom prst="rect">
             <a:avLst/>
@@ -758,7 +1043,7 @@
             <a:noAutofit/>
           </a:bodyPr>
           <a:p>
-            <a:pPr marL="216000" indent="-214560">
+            <a:pPr marL="216000" indent="-214200">
               <a:lnSpc>
                 <a:spcPct val="100000"/>
               </a:lnSpc>
@@ -774,7 +1059,7 @@
             </a:endParaRPr>
           </a:p>
           <a:p>
-            <a:pPr marL="216000" indent="-214560">
+            <a:pPr marL="216000" indent="-214200">
               <a:lnSpc>
                 <a:spcPct val="100000"/>
               </a:lnSpc>
@@ -790,7 +1075,7 @@
             </a:endParaRPr>
           </a:p>
           <a:p>
-            <a:pPr marL="216000" indent="-214560">
+            <a:pPr marL="216000" indent="-214200">
               <a:lnSpc>
                 <a:spcPct val="100000"/>
               </a:lnSpc>
@@ -806,7 +1091,7 @@
             </a:endParaRPr>
           </a:p>
           <a:p>
-            <a:pPr marL="216000" indent="-214560">
+            <a:pPr marL="216000" indent="-214200">
               <a:lnSpc>
                 <a:spcPct val="100000"/>
               </a:lnSpc>
@@ -822,7 +1107,7 @@
             </a:endParaRPr>
           </a:p>
           <a:p>
-            <a:pPr marL="216000" indent="-214560">
+            <a:pPr marL="216000" indent="-214200">
               <a:lnSpc>
                 <a:spcPct val="100000"/>
               </a:lnSpc>
@@ -896,7 +1181,7 @@
         <p:spPr>
           <a:xfrm>
             <a:off x="503640" y="301680"/>
-            <a:ext cx="9068400" cy="1261800"/>
+            <a:ext cx="9069120" cy="1262520"/>
           </a:xfrm>
           <a:prstGeom prst="rect">
             <a:avLst/>
@@ -927,7 +1212,7 @@
         <p:spPr>
           <a:xfrm>
             <a:off x="503640" y="1769400"/>
-            <a:ext cx="9068400" cy="2091600"/>
+            <a:ext cx="9069120" cy="2091960"/>
           </a:xfrm>
           <a:prstGeom prst="rect">
             <a:avLst/>
@@ -956,8 +1241,8 @@
         </p:nvSpPr>
         <p:spPr>
           <a:xfrm>
-            <a:off x="503640" y="4060080"/>
-            <a:ext cx="9068400" cy="2091600"/>
+            <a:off x="503640" y="4060440"/>
+            <a:ext cx="9069120" cy="2091960"/>
           </a:xfrm>
           <a:prstGeom prst="rect">
             <a:avLst/>
@@ -1009,7 +1294,7 @@
         <p:spPr>
           <a:xfrm>
             <a:off x="503640" y="301680"/>
-            <a:ext cx="9068400" cy="1261800"/>
+            <a:ext cx="9069120" cy="1262520"/>
           </a:xfrm>
           <a:prstGeom prst="rect">
             <a:avLst/>
@@ -1040,7 +1325,7 @@
         <p:spPr>
           <a:xfrm>
             <a:off x="503640" y="1769400"/>
-            <a:ext cx="4425120" cy="2091600"/>
+            <a:ext cx="4425480" cy="2091960"/>
           </a:xfrm>
           <a:prstGeom prst="rect">
             <a:avLst/>
@@ -1069,8 +1354,8 @@
         </p:nvSpPr>
         <p:spPr>
           <a:xfrm>
-            <a:off x="5150520" y="1769400"/>
-            <a:ext cx="4425120" cy="2091600"/>
+            <a:off x="5150880" y="1769400"/>
+            <a:ext cx="4425480" cy="2091960"/>
           </a:xfrm>
           <a:prstGeom prst="rect">
             <a:avLst/>
@@ -1099,8 +1384,8 @@
         </p:nvSpPr>
         <p:spPr>
           <a:xfrm>
-            <a:off x="503640" y="4060080"/>
-            <a:ext cx="4425120" cy="2091600"/>
+            <a:off x="503640" y="4060440"/>
+            <a:ext cx="4425480" cy="2091960"/>
           </a:xfrm>
           <a:prstGeom prst="rect">
             <a:avLst/>
@@ -1129,8 +1414,8 @@
         </p:nvSpPr>
         <p:spPr>
           <a:xfrm>
-            <a:off x="5150520" y="4060080"/>
-            <a:ext cx="4425120" cy="2091600"/>
+            <a:off x="5150880" y="4060440"/>
+            <a:ext cx="4425480" cy="2091960"/>
           </a:xfrm>
           <a:prstGeom prst="rect">
             <a:avLst/>
@@ -1182,7 +1467,7 @@
         <p:spPr>
           <a:xfrm>
             <a:off x="503640" y="301680"/>
-            <a:ext cx="9068400" cy="1261800"/>
+            <a:ext cx="9069120" cy="1262520"/>
           </a:xfrm>
           <a:prstGeom prst="rect">
             <a:avLst/>
@@ -1213,7 +1498,7 @@
         <p:spPr>
           <a:xfrm>
             <a:off x="503640" y="1769400"/>
-            <a:ext cx="2919960" cy="2091600"/>
+            <a:ext cx="2919960" cy="2091960"/>
           </a:xfrm>
           <a:prstGeom prst="rect">
             <a:avLst/>
@@ -1243,7 +1528,7 @@
         <p:spPr>
           <a:xfrm>
             <a:off x="3570120" y="1769400"/>
-            <a:ext cx="2919960" cy="2091600"/>
+            <a:ext cx="2919960" cy="2091960"/>
           </a:xfrm>
           <a:prstGeom prst="rect">
             <a:avLst/>
@@ -1273,7 +1558,7 @@
         <p:spPr>
           <a:xfrm>
             <a:off x="6636240" y="1769400"/>
-            <a:ext cx="2919960" cy="2091600"/>
+            <a:ext cx="2919960" cy="2091960"/>
           </a:xfrm>
           <a:prstGeom prst="rect">
             <a:avLst/>
@@ -1302,8 +1587,8 @@
         </p:nvSpPr>
         <p:spPr>
           <a:xfrm>
-            <a:off x="503640" y="4060080"/>
-            <a:ext cx="2919960" cy="2091600"/>
+            <a:off x="503640" y="4060440"/>
+            <a:ext cx="2919960" cy="2091960"/>
           </a:xfrm>
           <a:prstGeom prst="rect">
             <a:avLst/>
@@ -1332,8 +1617,8 @@
         </p:nvSpPr>
         <p:spPr>
           <a:xfrm>
-            <a:off x="3570120" y="4060080"/>
-            <a:ext cx="2919960" cy="2091600"/>
+            <a:off x="3570120" y="4060440"/>
+            <a:ext cx="2919960" cy="2091960"/>
           </a:xfrm>
           <a:prstGeom prst="rect">
             <a:avLst/>
@@ -1362,8 +1647,8 @@
         </p:nvSpPr>
         <p:spPr>
           <a:xfrm>
-            <a:off x="6636240" y="4060080"/>
-            <a:ext cx="2919960" cy="2091600"/>
+            <a:off x="6636240" y="4060440"/>
+            <a:ext cx="2919960" cy="2091960"/>
           </a:xfrm>
           <a:prstGeom prst="rect">
             <a:avLst/>
@@ -1437,7 +1722,7 @@
         <p:spPr>
           <a:xfrm>
             <a:off x="503640" y="301680"/>
-            <a:ext cx="9068400" cy="1261800"/>
+            <a:ext cx="9069120" cy="1262520"/>
           </a:xfrm>
           <a:prstGeom prst="rect">
             <a:avLst/>
@@ -1468,7 +1753,7 @@
         <p:spPr>
           <a:xfrm>
             <a:off x="503640" y="1769400"/>
-            <a:ext cx="9068400" cy="4385160"/>
+            <a:ext cx="9069120" cy="4385880"/>
           </a:xfrm>
           <a:prstGeom prst="rect">
             <a:avLst/>
@@ -1521,7 +1806,7 @@
         <p:spPr>
           <a:xfrm>
             <a:off x="503640" y="301680"/>
-            <a:ext cx="9068400" cy="1261800"/>
+            <a:ext cx="9069120" cy="1262520"/>
           </a:xfrm>
           <a:prstGeom prst="rect">
             <a:avLst/>
@@ -1552,7 +1837,7 @@
         <p:spPr>
           <a:xfrm>
             <a:off x="503640" y="1769400"/>
-            <a:ext cx="9068400" cy="4385160"/>
+            <a:ext cx="9069120" cy="4385880"/>
           </a:xfrm>
           <a:prstGeom prst="rect">
             <a:avLst/>
@@ -1604,7 +1889,7 @@
         <p:spPr>
           <a:xfrm>
             <a:off x="503640" y="301680"/>
-            <a:ext cx="9068400" cy="1261800"/>
+            <a:ext cx="9069120" cy="1262520"/>
           </a:xfrm>
           <a:prstGeom prst="rect">
             <a:avLst/>
@@ -1635,7 +1920,7 @@
         <p:spPr>
           <a:xfrm>
             <a:off x="503640" y="1769400"/>
-            <a:ext cx="4425120" cy="4385160"/>
+            <a:ext cx="4425480" cy="4385880"/>
           </a:xfrm>
           <a:prstGeom prst="rect">
             <a:avLst/>
@@ -1664,8 +1949,8 @@
         </p:nvSpPr>
         <p:spPr>
           <a:xfrm>
-            <a:off x="5150520" y="1769400"/>
-            <a:ext cx="4425120" cy="4385160"/>
+            <a:off x="5150880" y="1769400"/>
+            <a:ext cx="4425480" cy="4385880"/>
           </a:xfrm>
           <a:prstGeom prst="rect">
             <a:avLst/>
@@ -1717,7 +2002,7 @@
         <p:spPr>
           <a:xfrm>
             <a:off x="503640" y="301680"/>
-            <a:ext cx="9068400" cy="1261800"/>
+            <a:ext cx="9069120" cy="1262520"/>
           </a:xfrm>
           <a:prstGeom prst="rect">
             <a:avLst/>
@@ -1770,7 +2055,7 @@
         <p:spPr>
           <a:xfrm>
             <a:off x="503640" y="301680"/>
-            <a:ext cx="9068400" cy="5850360"/>
+            <a:ext cx="9069120" cy="5853600"/>
           </a:xfrm>
           <a:prstGeom prst="rect">
             <a:avLst/>
@@ -1823,7 +2108,7 @@
         <p:spPr>
           <a:xfrm>
             <a:off x="503640" y="301680"/>
-            <a:ext cx="9068400" cy="1261800"/>
+            <a:ext cx="9069120" cy="1262520"/>
           </a:xfrm>
           <a:prstGeom prst="rect">
             <a:avLst/>
@@ -1854,7 +2139,7 @@
         <p:spPr>
           <a:xfrm>
             <a:off x="503640" y="1769400"/>
-            <a:ext cx="4425120" cy="2091600"/>
+            <a:ext cx="4425480" cy="2091960"/>
           </a:xfrm>
           <a:prstGeom prst="rect">
             <a:avLst/>
@@ -1883,8 +2168,8 @@
         </p:nvSpPr>
         <p:spPr>
           <a:xfrm>
-            <a:off x="5150520" y="1769400"/>
-            <a:ext cx="4425120" cy="4385160"/>
+            <a:off x="5150880" y="1769400"/>
+            <a:ext cx="4425480" cy="4385880"/>
           </a:xfrm>
           <a:prstGeom prst="rect">
             <a:avLst/>
@@ -1913,8 +2198,8 @@
         </p:nvSpPr>
         <p:spPr>
           <a:xfrm>
-            <a:off x="503640" y="4060080"/>
-            <a:ext cx="4425120" cy="2091600"/>
+            <a:off x="503640" y="4060440"/>
+            <a:ext cx="4425480" cy="2091960"/>
           </a:xfrm>
           <a:prstGeom prst="rect">
             <a:avLst/>
@@ -1966,7 +2251,7 @@
         <p:spPr>
           <a:xfrm>
             <a:off x="503640" y="301680"/>
-            <a:ext cx="9068400" cy="1261800"/>
+            <a:ext cx="9069120" cy="1262520"/>
           </a:xfrm>
           <a:prstGeom prst="rect">
             <a:avLst/>
@@ -1997,7 +2282,7 @@
         <p:spPr>
           <a:xfrm>
             <a:off x="503640" y="1769400"/>
-            <a:ext cx="9068400" cy="4385160"/>
+            <a:ext cx="9069120" cy="4385880"/>
           </a:xfrm>
           <a:prstGeom prst="rect">
             <a:avLst/>
@@ -2050,7 +2335,7 @@
         <p:spPr>
           <a:xfrm>
             <a:off x="503640" y="301680"/>
-            <a:ext cx="9068400" cy="1261800"/>
+            <a:ext cx="9069120" cy="1262520"/>
           </a:xfrm>
           <a:prstGeom prst="rect">
             <a:avLst/>
@@ -2081,7 +2366,7 @@
         <p:spPr>
           <a:xfrm>
             <a:off x="503640" y="1769400"/>
-            <a:ext cx="4425120" cy="4385160"/>
+            <a:ext cx="4425480" cy="4385880"/>
           </a:xfrm>
           <a:prstGeom prst="rect">
             <a:avLst/>
@@ -2110,8 +2395,8 @@
         </p:nvSpPr>
         <p:spPr>
           <a:xfrm>
-            <a:off x="5150520" y="1769400"/>
-            <a:ext cx="4425120" cy="2091600"/>
+            <a:off x="5150880" y="1769400"/>
+            <a:ext cx="4425480" cy="2091960"/>
           </a:xfrm>
           <a:prstGeom prst="rect">
             <a:avLst/>
@@ -2140,8 +2425,8 @@
         </p:nvSpPr>
         <p:spPr>
           <a:xfrm>
-            <a:off x="5150520" y="4060080"/>
-            <a:ext cx="4425120" cy="2091600"/>
+            <a:off x="5150880" y="4060440"/>
+            <a:ext cx="4425480" cy="2091960"/>
           </a:xfrm>
           <a:prstGeom prst="rect">
             <a:avLst/>
@@ -2193,7 +2478,7 @@
         <p:spPr>
           <a:xfrm>
             <a:off x="503640" y="301680"/>
-            <a:ext cx="9068400" cy="1261800"/>
+            <a:ext cx="9069120" cy="1262520"/>
           </a:xfrm>
           <a:prstGeom prst="rect">
             <a:avLst/>
@@ -2224,7 +2509,7 @@
         <p:spPr>
           <a:xfrm>
             <a:off x="503640" y="1769400"/>
-            <a:ext cx="4425120" cy="2091600"/>
+            <a:ext cx="4425480" cy="2091960"/>
           </a:xfrm>
           <a:prstGeom prst="rect">
             <a:avLst/>
@@ -2253,8 +2538,8 @@
         </p:nvSpPr>
         <p:spPr>
           <a:xfrm>
-            <a:off x="5150520" y="1769400"/>
-            <a:ext cx="4425120" cy="2091600"/>
+            <a:off x="5150880" y="1769400"/>
+            <a:ext cx="4425480" cy="2091960"/>
           </a:xfrm>
           <a:prstGeom prst="rect">
             <a:avLst/>
@@ -2283,8 +2568,8 @@
         </p:nvSpPr>
         <p:spPr>
           <a:xfrm>
-            <a:off x="503640" y="4060080"/>
-            <a:ext cx="9068400" cy="2091600"/>
+            <a:off x="503640" y="4060440"/>
+            <a:ext cx="9069120" cy="2091960"/>
           </a:xfrm>
           <a:prstGeom prst="rect">
             <a:avLst/>
@@ -2336,7 +2621,7 @@
         <p:spPr>
           <a:xfrm>
             <a:off x="503640" y="301680"/>
-            <a:ext cx="9068400" cy="1261800"/>
+            <a:ext cx="9069120" cy="1262520"/>
           </a:xfrm>
           <a:prstGeom prst="rect">
             <a:avLst/>
@@ -2367,7 +2652,7 @@
         <p:spPr>
           <a:xfrm>
             <a:off x="503640" y="1769400"/>
-            <a:ext cx="9068400" cy="2091600"/>
+            <a:ext cx="9069120" cy="2091960"/>
           </a:xfrm>
           <a:prstGeom prst="rect">
             <a:avLst/>
@@ -2396,8 +2681,8 @@
         </p:nvSpPr>
         <p:spPr>
           <a:xfrm>
-            <a:off x="503640" y="4060080"/>
-            <a:ext cx="9068400" cy="2091600"/>
+            <a:off x="503640" y="4060440"/>
+            <a:ext cx="9069120" cy="2091960"/>
           </a:xfrm>
           <a:prstGeom prst="rect">
             <a:avLst/>
@@ -2449,7 +2734,7 @@
         <p:spPr>
           <a:xfrm>
             <a:off x="503640" y="301680"/>
-            <a:ext cx="9068400" cy="1261800"/>
+            <a:ext cx="9069120" cy="1262520"/>
           </a:xfrm>
           <a:prstGeom prst="rect">
             <a:avLst/>
@@ -2480,7 +2765,7 @@
         <p:spPr>
           <a:xfrm>
             <a:off x="503640" y="1769400"/>
-            <a:ext cx="4425120" cy="2091600"/>
+            <a:ext cx="4425480" cy="2091960"/>
           </a:xfrm>
           <a:prstGeom prst="rect">
             <a:avLst/>
@@ -2509,8 +2794,8 @@
         </p:nvSpPr>
         <p:spPr>
           <a:xfrm>
-            <a:off x="5150520" y="1769400"/>
-            <a:ext cx="4425120" cy="2091600"/>
+            <a:off x="5150880" y="1769400"/>
+            <a:ext cx="4425480" cy="2091960"/>
           </a:xfrm>
           <a:prstGeom prst="rect">
             <a:avLst/>
@@ -2539,8 +2824,8 @@
         </p:nvSpPr>
         <p:spPr>
           <a:xfrm>
-            <a:off x="503640" y="4060080"/>
-            <a:ext cx="4425120" cy="2091600"/>
+            <a:off x="503640" y="4060440"/>
+            <a:ext cx="4425480" cy="2091960"/>
           </a:xfrm>
           <a:prstGeom prst="rect">
             <a:avLst/>
@@ -2569,8 +2854,8 @@
         </p:nvSpPr>
         <p:spPr>
           <a:xfrm>
-            <a:off x="5150520" y="4060080"/>
-            <a:ext cx="4425120" cy="2091600"/>
+            <a:off x="5150880" y="4060440"/>
+            <a:ext cx="4425480" cy="2091960"/>
           </a:xfrm>
           <a:prstGeom prst="rect">
             <a:avLst/>
@@ -2622,7 +2907,7 @@
         <p:spPr>
           <a:xfrm>
             <a:off x="503640" y="301680"/>
-            <a:ext cx="9068400" cy="1261800"/>
+            <a:ext cx="9069120" cy="1262520"/>
           </a:xfrm>
           <a:prstGeom prst="rect">
             <a:avLst/>
@@ -2653,7 +2938,7 @@
         <p:spPr>
           <a:xfrm>
             <a:off x="503640" y="1769400"/>
-            <a:ext cx="2919960" cy="2091600"/>
+            <a:ext cx="2919960" cy="2091960"/>
           </a:xfrm>
           <a:prstGeom prst="rect">
             <a:avLst/>
@@ -2683,7 +2968,7 @@
         <p:spPr>
           <a:xfrm>
             <a:off x="3570120" y="1769400"/>
-            <a:ext cx="2919960" cy="2091600"/>
+            <a:ext cx="2919960" cy="2091960"/>
           </a:xfrm>
           <a:prstGeom prst="rect">
             <a:avLst/>
@@ -2713,7 +2998,7 @@
         <p:spPr>
           <a:xfrm>
             <a:off x="6636240" y="1769400"/>
-            <a:ext cx="2919960" cy="2091600"/>
+            <a:ext cx="2919960" cy="2091960"/>
           </a:xfrm>
           <a:prstGeom prst="rect">
             <a:avLst/>
@@ -2742,8 +3027,8 @@
         </p:nvSpPr>
         <p:spPr>
           <a:xfrm>
-            <a:off x="503640" y="4060080"/>
-            <a:ext cx="2919960" cy="2091600"/>
+            <a:off x="503640" y="4060440"/>
+            <a:ext cx="2919960" cy="2091960"/>
           </a:xfrm>
           <a:prstGeom prst="rect">
             <a:avLst/>
@@ -2772,8 +3057,8 @@
         </p:nvSpPr>
         <p:spPr>
           <a:xfrm>
-            <a:off x="3570120" y="4060080"/>
-            <a:ext cx="2919960" cy="2091600"/>
+            <a:off x="3570120" y="4060440"/>
+            <a:ext cx="2919960" cy="2091960"/>
           </a:xfrm>
           <a:prstGeom prst="rect">
             <a:avLst/>
@@ -2802,8 +3087,8 @@
         </p:nvSpPr>
         <p:spPr>
           <a:xfrm>
-            <a:off x="6636240" y="4060080"/>
-            <a:ext cx="2919960" cy="2091600"/>
+            <a:off x="6636240" y="4060440"/>
+            <a:ext cx="2919960" cy="2091960"/>
           </a:xfrm>
           <a:prstGeom prst="rect">
             <a:avLst/>
@@ -2877,7 +3162,7 @@
         <p:spPr>
           <a:xfrm>
             <a:off x="503640" y="301680"/>
-            <a:ext cx="9068400" cy="1261800"/>
+            <a:ext cx="9069120" cy="1262520"/>
           </a:xfrm>
           <a:prstGeom prst="rect">
             <a:avLst/>
@@ -2908,7 +3193,7 @@
         <p:spPr>
           <a:xfrm>
             <a:off x="503640" y="1769400"/>
-            <a:ext cx="9068400" cy="4385160"/>
+            <a:ext cx="9069120" cy="4385880"/>
           </a:xfrm>
           <a:prstGeom prst="rect">
             <a:avLst/>
@@ -2961,7 +3246,7 @@
         <p:spPr>
           <a:xfrm>
             <a:off x="503640" y="301680"/>
-            <a:ext cx="9068400" cy="1261800"/>
+            <a:ext cx="9069120" cy="1262520"/>
           </a:xfrm>
           <a:prstGeom prst="rect">
             <a:avLst/>
@@ -2992,7 +3277,7 @@
         <p:spPr>
           <a:xfrm>
             <a:off x="503640" y="1769400"/>
-            <a:ext cx="9068400" cy="4385160"/>
+            <a:ext cx="9069120" cy="4385880"/>
           </a:xfrm>
           <a:prstGeom prst="rect">
             <a:avLst/>
@@ -3044,7 +3329,7 @@
         <p:spPr>
           <a:xfrm>
             <a:off x="503640" y="301680"/>
-            <a:ext cx="9068400" cy="1261800"/>
+            <a:ext cx="9069120" cy="1262520"/>
           </a:xfrm>
           <a:prstGeom prst="rect">
             <a:avLst/>
@@ -3075,7 +3360,7 @@
         <p:spPr>
           <a:xfrm>
             <a:off x="503640" y="1769400"/>
-            <a:ext cx="4425120" cy="4385160"/>
+            <a:ext cx="4425480" cy="4385880"/>
           </a:xfrm>
           <a:prstGeom prst="rect">
             <a:avLst/>
@@ -3104,8 +3389,8 @@
         </p:nvSpPr>
         <p:spPr>
           <a:xfrm>
-            <a:off x="5150520" y="1769400"/>
-            <a:ext cx="4425120" cy="4385160"/>
+            <a:off x="5150880" y="1769400"/>
+            <a:ext cx="4425480" cy="4385880"/>
           </a:xfrm>
           <a:prstGeom prst="rect">
             <a:avLst/>
@@ -3157,7 +3442,7 @@
         <p:spPr>
           <a:xfrm>
             <a:off x="503640" y="301680"/>
-            <a:ext cx="9068400" cy="1261800"/>
+            <a:ext cx="9069120" cy="1262520"/>
           </a:xfrm>
           <a:prstGeom prst="rect">
             <a:avLst/>
@@ -3210,7 +3495,7 @@
         <p:spPr>
           <a:xfrm>
             <a:off x="503640" y="301680"/>
-            <a:ext cx="9068400" cy="1261800"/>
+            <a:ext cx="9069120" cy="1262520"/>
           </a:xfrm>
           <a:prstGeom prst="rect">
             <a:avLst/>
@@ -3241,7 +3526,7 @@
         <p:spPr>
           <a:xfrm>
             <a:off x="503640" y="1769400"/>
-            <a:ext cx="9068400" cy="4385160"/>
+            <a:ext cx="9069120" cy="4385880"/>
           </a:xfrm>
           <a:prstGeom prst="rect">
             <a:avLst/>
@@ -3293,7 +3578,7 @@
         <p:spPr>
           <a:xfrm>
             <a:off x="503640" y="301680"/>
-            <a:ext cx="9068400" cy="5850360"/>
+            <a:ext cx="9069120" cy="5853600"/>
           </a:xfrm>
           <a:prstGeom prst="rect">
             <a:avLst/>
@@ -3346,7 +3631,7 @@
         <p:spPr>
           <a:xfrm>
             <a:off x="503640" y="301680"/>
-            <a:ext cx="9068400" cy="1261800"/>
+            <a:ext cx="9069120" cy="1262520"/>
           </a:xfrm>
           <a:prstGeom prst="rect">
             <a:avLst/>
@@ -3377,7 +3662,7 @@
         <p:spPr>
           <a:xfrm>
             <a:off x="503640" y="1769400"/>
-            <a:ext cx="4425120" cy="2091600"/>
+            <a:ext cx="4425480" cy="2091960"/>
           </a:xfrm>
           <a:prstGeom prst="rect">
             <a:avLst/>
@@ -3406,8 +3691,8 @@
         </p:nvSpPr>
         <p:spPr>
           <a:xfrm>
-            <a:off x="5150520" y="1769400"/>
-            <a:ext cx="4425120" cy="4385160"/>
+            <a:off x="5150880" y="1769400"/>
+            <a:ext cx="4425480" cy="4385880"/>
           </a:xfrm>
           <a:prstGeom prst="rect">
             <a:avLst/>
@@ -3436,8 +3721,8 @@
         </p:nvSpPr>
         <p:spPr>
           <a:xfrm>
-            <a:off x="503640" y="4060080"/>
-            <a:ext cx="4425120" cy="2091600"/>
+            <a:off x="503640" y="4060440"/>
+            <a:ext cx="4425480" cy="2091960"/>
           </a:xfrm>
           <a:prstGeom prst="rect">
             <a:avLst/>
@@ -3489,7 +3774,7 @@
         <p:spPr>
           <a:xfrm>
             <a:off x="503640" y="301680"/>
-            <a:ext cx="9068400" cy="1261800"/>
+            <a:ext cx="9069120" cy="1262520"/>
           </a:xfrm>
           <a:prstGeom prst="rect">
             <a:avLst/>
@@ -3520,7 +3805,7 @@
         <p:spPr>
           <a:xfrm>
             <a:off x="503640" y="1769400"/>
-            <a:ext cx="4425120" cy="4385160"/>
+            <a:ext cx="4425480" cy="4385880"/>
           </a:xfrm>
           <a:prstGeom prst="rect">
             <a:avLst/>
@@ -3549,8 +3834,8 @@
         </p:nvSpPr>
         <p:spPr>
           <a:xfrm>
-            <a:off x="5150520" y="1769400"/>
-            <a:ext cx="4425120" cy="2091600"/>
+            <a:off x="5150880" y="1769400"/>
+            <a:ext cx="4425480" cy="2091960"/>
           </a:xfrm>
           <a:prstGeom prst="rect">
             <a:avLst/>
@@ -3579,8 +3864,8 @@
         </p:nvSpPr>
         <p:spPr>
           <a:xfrm>
-            <a:off x="5150520" y="4060080"/>
-            <a:ext cx="4425120" cy="2091600"/>
+            <a:off x="5150880" y="4060440"/>
+            <a:ext cx="4425480" cy="2091960"/>
           </a:xfrm>
           <a:prstGeom prst="rect">
             <a:avLst/>
@@ -3632,7 +3917,7 @@
         <p:spPr>
           <a:xfrm>
             <a:off x="503640" y="301680"/>
-            <a:ext cx="9068400" cy="1261800"/>
+            <a:ext cx="9069120" cy="1262520"/>
           </a:xfrm>
           <a:prstGeom prst="rect">
             <a:avLst/>
@@ -3663,7 +3948,7 @@
         <p:spPr>
           <a:xfrm>
             <a:off x="503640" y="1769400"/>
-            <a:ext cx="4425120" cy="2091600"/>
+            <a:ext cx="4425480" cy="2091960"/>
           </a:xfrm>
           <a:prstGeom prst="rect">
             <a:avLst/>
@@ -3692,8 +3977,8 @@
         </p:nvSpPr>
         <p:spPr>
           <a:xfrm>
-            <a:off x="5150520" y="1769400"/>
-            <a:ext cx="4425120" cy="2091600"/>
+            <a:off x="5150880" y="1769400"/>
+            <a:ext cx="4425480" cy="2091960"/>
           </a:xfrm>
           <a:prstGeom prst="rect">
             <a:avLst/>
@@ -3722,8 +4007,8 @@
         </p:nvSpPr>
         <p:spPr>
           <a:xfrm>
-            <a:off x="503640" y="4060080"/>
-            <a:ext cx="9068400" cy="2091600"/>
+            <a:off x="503640" y="4060440"/>
+            <a:ext cx="9069120" cy="2091960"/>
           </a:xfrm>
           <a:prstGeom prst="rect">
             <a:avLst/>
@@ -3775,7 +4060,7 @@
         <p:spPr>
           <a:xfrm>
             <a:off x="503640" y="301680"/>
-            <a:ext cx="9068400" cy="1261800"/>
+            <a:ext cx="9069120" cy="1262520"/>
           </a:xfrm>
           <a:prstGeom prst="rect">
             <a:avLst/>
@@ -3806,7 +4091,7 @@
         <p:spPr>
           <a:xfrm>
             <a:off x="503640" y="1769400"/>
-            <a:ext cx="9068400" cy="2091600"/>
+            <a:ext cx="9069120" cy="2091960"/>
           </a:xfrm>
           <a:prstGeom prst="rect">
             <a:avLst/>
@@ -3835,8 +4120,8 @@
         </p:nvSpPr>
         <p:spPr>
           <a:xfrm>
-            <a:off x="503640" y="4060080"/>
-            <a:ext cx="9068400" cy="2091600"/>
+            <a:off x="503640" y="4060440"/>
+            <a:ext cx="9069120" cy="2091960"/>
           </a:xfrm>
           <a:prstGeom prst="rect">
             <a:avLst/>
@@ -3888,7 +4173,7 @@
         <p:spPr>
           <a:xfrm>
             <a:off x="503640" y="301680"/>
-            <a:ext cx="9068400" cy="1261800"/>
+            <a:ext cx="9069120" cy="1262520"/>
           </a:xfrm>
           <a:prstGeom prst="rect">
             <a:avLst/>
@@ -3919,7 +4204,7 @@
         <p:spPr>
           <a:xfrm>
             <a:off x="503640" y="1769400"/>
-            <a:ext cx="4425120" cy="2091600"/>
+            <a:ext cx="4425480" cy="2091960"/>
           </a:xfrm>
           <a:prstGeom prst="rect">
             <a:avLst/>
@@ -3948,8 +4233,8 @@
         </p:nvSpPr>
         <p:spPr>
           <a:xfrm>
-            <a:off x="5150520" y="1769400"/>
-            <a:ext cx="4425120" cy="2091600"/>
+            <a:off x="5150880" y="1769400"/>
+            <a:ext cx="4425480" cy="2091960"/>
           </a:xfrm>
           <a:prstGeom prst="rect">
             <a:avLst/>
@@ -3978,8 +4263,8 @@
         </p:nvSpPr>
         <p:spPr>
           <a:xfrm>
-            <a:off x="503640" y="4060080"/>
-            <a:ext cx="4425120" cy="2091600"/>
+            <a:off x="503640" y="4060440"/>
+            <a:ext cx="4425480" cy="2091960"/>
           </a:xfrm>
           <a:prstGeom prst="rect">
             <a:avLst/>
@@ -4008,8 +4293,8 @@
         </p:nvSpPr>
         <p:spPr>
           <a:xfrm>
-            <a:off x="5150520" y="4060080"/>
-            <a:ext cx="4425120" cy="2091600"/>
+            <a:off x="5150880" y="4060440"/>
+            <a:ext cx="4425480" cy="2091960"/>
           </a:xfrm>
           <a:prstGeom prst="rect">
             <a:avLst/>
@@ -4061,7 +4346,7 @@
         <p:spPr>
           <a:xfrm>
             <a:off x="503640" y="301680"/>
-            <a:ext cx="9068400" cy="1261800"/>
+            <a:ext cx="9069120" cy="1262520"/>
           </a:xfrm>
           <a:prstGeom prst="rect">
             <a:avLst/>
@@ -4092,7 +4377,7 @@
         <p:spPr>
           <a:xfrm>
             <a:off x="503640" y="1769400"/>
-            <a:ext cx="2919960" cy="2091600"/>
+            <a:ext cx="2919960" cy="2091960"/>
           </a:xfrm>
           <a:prstGeom prst="rect">
             <a:avLst/>
@@ -4122,7 +4407,7 @@
         <p:spPr>
           <a:xfrm>
             <a:off x="3570120" y="1769400"/>
-            <a:ext cx="2919960" cy="2091600"/>
+            <a:ext cx="2919960" cy="2091960"/>
           </a:xfrm>
           <a:prstGeom prst="rect">
             <a:avLst/>
@@ -4152,7 +4437,7 @@
         <p:spPr>
           <a:xfrm>
             <a:off x="6636240" y="1769400"/>
-            <a:ext cx="2919960" cy="2091600"/>
+            <a:ext cx="2919960" cy="2091960"/>
           </a:xfrm>
           <a:prstGeom prst="rect">
             <a:avLst/>
@@ -4181,8 +4466,8 @@
         </p:nvSpPr>
         <p:spPr>
           <a:xfrm>
-            <a:off x="503640" y="4060080"/>
-            <a:ext cx="2919960" cy="2091600"/>
+            <a:off x="503640" y="4060440"/>
+            <a:ext cx="2919960" cy="2091960"/>
           </a:xfrm>
           <a:prstGeom prst="rect">
             <a:avLst/>
@@ -4211,8 +4496,8 @@
         </p:nvSpPr>
         <p:spPr>
           <a:xfrm>
-            <a:off x="3570120" y="4060080"/>
-            <a:ext cx="2919960" cy="2091600"/>
+            <a:off x="3570120" y="4060440"/>
+            <a:ext cx="2919960" cy="2091960"/>
           </a:xfrm>
           <a:prstGeom prst="rect">
             <a:avLst/>
@@ -4241,8 +4526,8 @@
         </p:nvSpPr>
         <p:spPr>
           <a:xfrm>
-            <a:off x="6636240" y="4060080"/>
-            <a:ext cx="2919960" cy="2091600"/>
+            <a:off x="6636240" y="4060440"/>
+            <a:ext cx="2919960" cy="2091960"/>
           </a:xfrm>
           <a:prstGeom prst="rect">
             <a:avLst/>
@@ -4316,7 +4601,7 @@
         <p:spPr>
           <a:xfrm>
             <a:off x="503640" y="301680"/>
-            <a:ext cx="9068400" cy="1261800"/>
+            <a:ext cx="9069120" cy="1262520"/>
           </a:xfrm>
           <a:prstGeom prst="rect">
             <a:avLst/>
@@ -4347,7 +4632,7 @@
         <p:spPr>
           <a:xfrm>
             <a:off x="503640" y="1769400"/>
-            <a:ext cx="9068400" cy="4385160"/>
+            <a:ext cx="9069120" cy="4385880"/>
           </a:xfrm>
           <a:prstGeom prst="rect">
             <a:avLst/>
@@ -4400,7 +4685,7 @@
         <p:spPr>
           <a:xfrm>
             <a:off x="503640" y="301680"/>
-            <a:ext cx="9068400" cy="1261800"/>
+            <a:ext cx="9069120" cy="1262520"/>
           </a:xfrm>
           <a:prstGeom prst="rect">
             <a:avLst/>
@@ -4431,7 +4716,7 @@
         <p:spPr>
           <a:xfrm>
             <a:off x="503640" y="1769400"/>
-            <a:ext cx="9068400" cy="4385160"/>
+            <a:ext cx="9069120" cy="4385880"/>
           </a:xfrm>
           <a:prstGeom prst="rect">
             <a:avLst/>
@@ -4483,7 +4768,7 @@
         <p:spPr>
           <a:xfrm>
             <a:off x="503640" y="301680"/>
-            <a:ext cx="9068400" cy="1261800"/>
+            <a:ext cx="9069120" cy="1262520"/>
           </a:xfrm>
           <a:prstGeom prst="rect">
             <a:avLst/>
@@ -4514,7 +4799,7 @@
         <p:spPr>
           <a:xfrm>
             <a:off x="503640" y="1769400"/>
-            <a:ext cx="4425120" cy="4385160"/>
+            <a:ext cx="4425480" cy="4385880"/>
           </a:xfrm>
           <a:prstGeom prst="rect">
             <a:avLst/>
@@ -4543,8 +4828,8 @@
         </p:nvSpPr>
         <p:spPr>
           <a:xfrm>
-            <a:off x="5150520" y="1769400"/>
-            <a:ext cx="4425120" cy="4385160"/>
+            <a:off x="5150880" y="1769400"/>
+            <a:ext cx="4425480" cy="4385880"/>
           </a:xfrm>
           <a:prstGeom prst="rect">
             <a:avLst/>
@@ -4596,7 +4881,7 @@
         <p:spPr>
           <a:xfrm>
             <a:off x="503640" y="301680"/>
-            <a:ext cx="9068400" cy="1261800"/>
+            <a:ext cx="9069120" cy="1262520"/>
           </a:xfrm>
           <a:prstGeom prst="rect">
             <a:avLst/>
@@ -4627,7 +4912,7 @@
         <p:spPr>
           <a:xfrm>
             <a:off x="503640" y="1769400"/>
-            <a:ext cx="4425120" cy="4385160"/>
+            <a:ext cx="4425480" cy="4385880"/>
           </a:xfrm>
           <a:prstGeom prst="rect">
             <a:avLst/>
@@ -4656,8 +4941,8 @@
         </p:nvSpPr>
         <p:spPr>
           <a:xfrm>
-            <a:off x="5150520" y="1769400"/>
-            <a:ext cx="4425120" cy="4385160"/>
+            <a:off x="5150880" y="1769400"/>
+            <a:ext cx="4425480" cy="4385880"/>
           </a:xfrm>
           <a:prstGeom prst="rect">
             <a:avLst/>
@@ -4709,7 +4994,7 @@
         <p:spPr>
           <a:xfrm>
             <a:off x="503640" y="301680"/>
-            <a:ext cx="9068400" cy="1261800"/>
+            <a:ext cx="9069120" cy="1262520"/>
           </a:xfrm>
           <a:prstGeom prst="rect">
             <a:avLst/>
@@ -4762,7 +5047,7 @@
         <p:spPr>
           <a:xfrm>
             <a:off x="503640" y="301680"/>
-            <a:ext cx="9068400" cy="5850360"/>
+            <a:ext cx="9069120" cy="5853600"/>
           </a:xfrm>
           <a:prstGeom prst="rect">
             <a:avLst/>
@@ -4815,7 +5100,7 @@
         <p:spPr>
           <a:xfrm>
             <a:off x="503640" y="301680"/>
-            <a:ext cx="9068400" cy="1261800"/>
+            <a:ext cx="9069120" cy="1262520"/>
           </a:xfrm>
           <a:prstGeom prst="rect">
             <a:avLst/>
@@ -4846,7 +5131,7 @@
         <p:spPr>
           <a:xfrm>
             <a:off x="503640" y="1769400"/>
-            <a:ext cx="4425120" cy="2091600"/>
+            <a:ext cx="4425480" cy="2091960"/>
           </a:xfrm>
           <a:prstGeom prst="rect">
             <a:avLst/>
@@ -4875,8 +5160,8 @@
         </p:nvSpPr>
         <p:spPr>
           <a:xfrm>
-            <a:off x="5150520" y="1769400"/>
-            <a:ext cx="4425120" cy="4385160"/>
+            <a:off x="5150880" y="1769400"/>
+            <a:ext cx="4425480" cy="4385880"/>
           </a:xfrm>
           <a:prstGeom prst="rect">
             <a:avLst/>
@@ -4905,8 +5190,8 @@
         </p:nvSpPr>
         <p:spPr>
           <a:xfrm>
-            <a:off x="503640" y="4060080"/>
-            <a:ext cx="4425120" cy="2091600"/>
+            <a:off x="503640" y="4060440"/>
+            <a:ext cx="4425480" cy="2091960"/>
           </a:xfrm>
           <a:prstGeom prst="rect">
             <a:avLst/>
@@ -4958,7 +5243,7 @@
         <p:spPr>
           <a:xfrm>
             <a:off x="503640" y="301680"/>
-            <a:ext cx="9068400" cy="1261800"/>
+            <a:ext cx="9069120" cy="1262520"/>
           </a:xfrm>
           <a:prstGeom prst="rect">
             <a:avLst/>
@@ -4989,7 +5274,7 @@
         <p:spPr>
           <a:xfrm>
             <a:off x="503640" y="1769400"/>
-            <a:ext cx="4425120" cy="4385160"/>
+            <a:ext cx="4425480" cy="4385880"/>
           </a:xfrm>
           <a:prstGeom prst="rect">
             <a:avLst/>
@@ -5018,8 +5303,8 @@
         </p:nvSpPr>
         <p:spPr>
           <a:xfrm>
-            <a:off x="5150520" y="1769400"/>
-            <a:ext cx="4425120" cy="2091600"/>
+            <a:off x="5150880" y="1769400"/>
+            <a:ext cx="4425480" cy="2091960"/>
           </a:xfrm>
           <a:prstGeom prst="rect">
             <a:avLst/>
@@ -5048,8 +5333,8 @@
         </p:nvSpPr>
         <p:spPr>
           <a:xfrm>
-            <a:off x="5150520" y="4060080"/>
-            <a:ext cx="4425120" cy="2091600"/>
+            <a:off x="5150880" y="4060440"/>
+            <a:ext cx="4425480" cy="2091960"/>
           </a:xfrm>
           <a:prstGeom prst="rect">
             <a:avLst/>
@@ -5101,7 +5386,7 @@
         <p:spPr>
           <a:xfrm>
             <a:off x="503640" y="301680"/>
-            <a:ext cx="9068400" cy="1261800"/>
+            <a:ext cx="9069120" cy="1262520"/>
           </a:xfrm>
           <a:prstGeom prst="rect">
             <a:avLst/>
@@ -5132,7 +5417,7 @@
         <p:spPr>
           <a:xfrm>
             <a:off x="503640" y="1769400"/>
-            <a:ext cx="4425120" cy="2091600"/>
+            <a:ext cx="4425480" cy="2091960"/>
           </a:xfrm>
           <a:prstGeom prst="rect">
             <a:avLst/>
@@ -5161,8 +5446,8 @@
         </p:nvSpPr>
         <p:spPr>
           <a:xfrm>
-            <a:off x="5150520" y="1769400"/>
-            <a:ext cx="4425120" cy="2091600"/>
+            <a:off x="5150880" y="1769400"/>
+            <a:ext cx="4425480" cy="2091960"/>
           </a:xfrm>
           <a:prstGeom prst="rect">
             <a:avLst/>
@@ -5191,8 +5476,8 @@
         </p:nvSpPr>
         <p:spPr>
           <a:xfrm>
-            <a:off x="503640" y="4060080"/>
-            <a:ext cx="9068400" cy="2091600"/>
+            <a:off x="503640" y="4060440"/>
+            <a:ext cx="9069120" cy="2091960"/>
           </a:xfrm>
           <a:prstGeom prst="rect">
             <a:avLst/>
@@ -5244,7 +5529,7 @@
         <p:spPr>
           <a:xfrm>
             <a:off x="503640" y="301680"/>
-            <a:ext cx="9068400" cy="1261800"/>
+            <a:ext cx="9069120" cy="1262520"/>
           </a:xfrm>
           <a:prstGeom prst="rect">
             <a:avLst/>
@@ -5275,7 +5560,7 @@
         <p:spPr>
           <a:xfrm>
             <a:off x="503640" y="1769400"/>
-            <a:ext cx="9068400" cy="2091600"/>
+            <a:ext cx="9069120" cy="2091960"/>
           </a:xfrm>
           <a:prstGeom prst="rect">
             <a:avLst/>
@@ -5304,8 +5589,8 @@
         </p:nvSpPr>
         <p:spPr>
           <a:xfrm>
-            <a:off x="503640" y="4060080"/>
-            <a:ext cx="9068400" cy="2091600"/>
+            <a:off x="503640" y="4060440"/>
+            <a:ext cx="9069120" cy="2091960"/>
           </a:xfrm>
           <a:prstGeom prst="rect">
             <a:avLst/>
@@ -5357,7 +5642,7 @@
         <p:spPr>
           <a:xfrm>
             <a:off x="503640" y="301680"/>
-            <a:ext cx="9068400" cy="1261800"/>
+            <a:ext cx="9069120" cy="1262520"/>
           </a:xfrm>
           <a:prstGeom prst="rect">
             <a:avLst/>
@@ -5388,7 +5673,7 @@
         <p:spPr>
           <a:xfrm>
             <a:off x="503640" y="1769400"/>
-            <a:ext cx="4425120" cy="2091600"/>
+            <a:ext cx="4425480" cy="2091960"/>
           </a:xfrm>
           <a:prstGeom prst="rect">
             <a:avLst/>
@@ -5417,8 +5702,8 @@
         </p:nvSpPr>
         <p:spPr>
           <a:xfrm>
-            <a:off x="5150520" y="1769400"/>
-            <a:ext cx="4425120" cy="2091600"/>
+            <a:off x="5150880" y="1769400"/>
+            <a:ext cx="4425480" cy="2091960"/>
           </a:xfrm>
           <a:prstGeom prst="rect">
             <a:avLst/>
@@ -5447,8 +5732,8 @@
         </p:nvSpPr>
         <p:spPr>
           <a:xfrm>
-            <a:off x="503640" y="4060080"/>
-            <a:ext cx="4425120" cy="2091600"/>
+            <a:off x="503640" y="4060440"/>
+            <a:ext cx="4425480" cy="2091960"/>
           </a:xfrm>
           <a:prstGeom prst="rect">
             <a:avLst/>
@@ -5477,8 +5762,8 @@
         </p:nvSpPr>
         <p:spPr>
           <a:xfrm>
-            <a:off x="5150520" y="4060080"/>
-            <a:ext cx="4425120" cy="2091600"/>
+            <a:off x="5150880" y="4060440"/>
+            <a:ext cx="4425480" cy="2091960"/>
           </a:xfrm>
           <a:prstGeom prst="rect">
             <a:avLst/>
@@ -5530,7 +5815,7 @@
         <p:spPr>
           <a:xfrm>
             <a:off x="503640" y="301680"/>
-            <a:ext cx="9068400" cy="1261800"/>
+            <a:ext cx="9069120" cy="1262520"/>
           </a:xfrm>
           <a:prstGeom prst="rect">
             <a:avLst/>
@@ -5561,7 +5846,7 @@
         <p:spPr>
           <a:xfrm>
             <a:off x="503640" y="1769400"/>
-            <a:ext cx="2919960" cy="2091600"/>
+            <a:ext cx="2919960" cy="2091960"/>
           </a:xfrm>
           <a:prstGeom prst="rect">
             <a:avLst/>
@@ -5591,7 +5876,7 @@
         <p:spPr>
           <a:xfrm>
             <a:off x="3570120" y="1769400"/>
-            <a:ext cx="2919960" cy="2091600"/>
+            <a:ext cx="2919960" cy="2091960"/>
           </a:xfrm>
           <a:prstGeom prst="rect">
             <a:avLst/>
@@ -5621,7 +5906,7 @@
         <p:spPr>
           <a:xfrm>
             <a:off x="6636240" y="1769400"/>
-            <a:ext cx="2919960" cy="2091600"/>
+            <a:ext cx="2919960" cy="2091960"/>
           </a:xfrm>
           <a:prstGeom prst="rect">
             <a:avLst/>
@@ -5650,8 +5935,8 @@
         </p:nvSpPr>
         <p:spPr>
           <a:xfrm>
-            <a:off x="503640" y="4060080"/>
-            <a:ext cx="2919960" cy="2091600"/>
+            <a:off x="503640" y="4060440"/>
+            <a:ext cx="2919960" cy="2091960"/>
           </a:xfrm>
           <a:prstGeom prst="rect">
             <a:avLst/>
@@ -5680,8 +5965,8 @@
         </p:nvSpPr>
         <p:spPr>
           <a:xfrm>
-            <a:off x="3570120" y="4060080"/>
-            <a:ext cx="2919960" cy="2091600"/>
+            <a:off x="3570120" y="4060440"/>
+            <a:ext cx="2919960" cy="2091960"/>
           </a:xfrm>
           <a:prstGeom prst="rect">
             <a:avLst/>
@@ -5710,8 +5995,8 @@
         </p:nvSpPr>
         <p:spPr>
           <a:xfrm>
-            <a:off x="6636240" y="4060080"/>
-            <a:ext cx="2919960" cy="2091600"/>
+            <a:off x="6636240" y="4060440"/>
+            <a:ext cx="2919960" cy="2091960"/>
           </a:xfrm>
           <a:prstGeom prst="rect">
             <a:avLst/>
@@ -5763,7 +6048,7 @@
         <p:spPr>
           <a:xfrm>
             <a:off x="503640" y="301680"/>
-            <a:ext cx="9068400" cy="1261800"/>
+            <a:ext cx="9069120" cy="1262520"/>
           </a:xfrm>
           <a:prstGeom prst="rect">
             <a:avLst/>
@@ -5816,7 +6101,7 @@
         <p:spPr>
           <a:xfrm>
             <a:off x="503640" y="301680"/>
-            <a:ext cx="9068400" cy="5850360"/>
+            <a:ext cx="9069120" cy="5853600"/>
           </a:xfrm>
           <a:prstGeom prst="rect">
             <a:avLst/>
@@ -5869,7 +6154,7 @@
         <p:spPr>
           <a:xfrm>
             <a:off x="503640" y="301680"/>
-            <a:ext cx="9068400" cy="1261800"/>
+            <a:ext cx="9069120" cy="1262520"/>
           </a:xfrm>
           <a:prstGeom prst="rect">
             <a:avLst/>
@@ -5900,7 +6185,7 @@
         <p:spPr>
           <a:xfrm>
             <a:off x="503640" y="1769400"/>
-            <a:ext cx="4425120" cy="2091600"/>
+            <a:ext cx="4425480" cy="2091960"/>
           </a:xfrm>
           <a:prstGeom prst="rect">
             <a:avLst/>
@@ -5929,8 +6214,8 @@
         </p:nvSpPr>
         <p:spPr>
           <a:xfrm>
-            <a:off x="5150520" y="1769400"/>
-            <a:ext cx="4425120" cy="4385160"/>
+            <a:off x="5150880" y="1769400"/>
+            <a:ext cx="4425480" cy="4385880"/>
           </a:xfrm>
           <a:prstGeom prst="rect">
             <a:avLst/>
@@ -5959,8 +6244,8 @@
         </p:nvSpPr>
         <p:spPr>
           <a:xfrm>
-            <a:off x="503640" y="4060080"/>
-            <a:ext cx="4425120" cy="2091600"/>
+            <a:off x="503640" y="4060440"/>
+            <a:ext cx="4425480" cy="2091960"/>
           </a:xfrm>
           <a:prstGeom prst="rect">
             <a:avLst/>
@@ -6012,7 +6297,7 @@
         <p:spPr>
           <a:xfrm>
             <a:off x="503640" y="301680"/>
-            <a:ext cx="9068400" cy="1261800"/>
+            <a:ext cx="9069120" cy="1262520"/>
           </a:xfrm>
           <a:prstGeom prst="rect">
             <a:avLst/>
@@ -6043,7 +6328,7 @@
         <p:spPr>
           <a:xfrm>
             <a:off x="503640" y="1769400"/>
-            <a:ext cx="4425120" cy="4385160"/>
+            <a:ext cx="4425480" cy="4385880"/>
           </a:xfrm>
           <a:prstGeom prst="rect">
             <a:avLst/>
@@ -6072,8 +6357,8 @@
         </p:nvSpPr>
         <p:spPr>
           <a:xfrm>
-            <a:off x="5150520" y="1769400"/>
-            <a:ext cx="4425120" cy="2091600"/>
+            <a:off x="5150880" y="1769400"/>
+            <a:ext cx="4425480" cy="2091960"/>
           </a:xfrm>
           <a:prstGeom prst="rect">
             <a:avLst/>
@@ -6102,8 +6387,8 @@
         </p:nvSpPr>
         <p:spPr>
           <a:xfrm>
-            <a:off x="5150520" y="4060080"/>
-            <a:ext cx="4425120" cy="2091600"/>
+            <a:off x="5150880" y="4060440"/>
+            <a:ext cx="4425480" cy="2091960"/>
           </a:xfrm>
           <a:prstGeom prst="rect">
             <a:avLst/>
@@ -6155,7 +6440,7 @@
         <p:spPr>
           <a:xfrm>
             <a:off x="503640" y="301680"/>
-            <a:ext cx="9068400" cy="1261800"/>
+            <a:ext cx="9069120" cy="1262520"/>
           </a:xfrm>
           <a:prstGeom prst="rect">
             <a:avLst/>
@@ -6186,7 +6471,7 @@
         <p:spPr>
           <a:xfrm>
             <a:off x="503640" y="1769400"/>
-            <a:ext cx="4425120" cy="2091600"/>
+            <a:ext cx="4425480" cy="2091960"/>
           </a:xfrm>
           <a:prstGeom prst="rect">
             <a:avLst/>
@@ -6215,8 +6500,8 @@
         </p:nvSpPr>
         <p:spPr>
           <a:xfrm>
-            <a:off x="5150520" y="1769400"/>
-            <a:ext cx="4425120" cy="2091600"/>
+            <a:off x="5150880" y="1769400"/>
+            <a:ext cx="4425480" cy="2091960"/>
           </a:xfrm>
           <a:prstGeom prst="rect">
             <a:avLst/>
@@ -6245,8 +6530,8 @@
         </p:nvSpPr>
         <p:spPr>
           <a:xfrm>
-            <a:off x="503640" y="4060080"/>
-            <a:ext cx="9068400" cy="2091600"/>
+            <a:off x="503640" y="4060440"/>
+            <a:ext cx="9069120" cy="2091960"/>
           </a:xfrm>
           <a:prstGeom prst="rect">
             <a:avLst/>
@@ -7097,7 +7382,7 @@
         <p:spPr>
           <a:xfrm>
             <a:off x="503640" y="301680"/>
-            <a:ext cx="9068400" cy="1261800"/>
+            <a:ext cx="9069120" cy="1262520"/>
           </a:xfrm>
           <a:prstGeom prst="rect">
             <a:avLst/>
@@ -7110,12 +7395,12 @@
           <a:p>
             <a:pPr algn="ctr"/>
             <a:r>
-              <a:rPr b="0" lang="en-US" sz="1800" spc="-1" strike="noStrike">
+              <a:rPr b="0" lang="en-US" sz="4400" spc="-1" strike="noStrike">
                 <a:latin typeface="Arial"/>
               </a:rPr>
               <a:t>Click to edit the title text format</a:t>
             </a:r>
-            <a:endParaRPr b="0" lang="en-US" sz="1800" spc="-1" strike="noStrike">
+            <a:endParaRPr b="0" lang="en-US" sz="4400" spc="-1" strike="noStrike">
               <a:latin typeface="Arial"/>
             </a:endParaRPr>
           </a:p>
@@ -7134,7 +7419,7 @@
         <p:spPr>
           <a:xfrm>
             <a:off x="503640" y="1769400"/>
-            <a:ext cx="9068400" cy="4385160"/>
+            <a:ext cx="9069120" cy="4385880"/>
           </a:xfrm>
           <a:prstGeom prst="rect">
             <a:avLst/>
@@ -7145,7 +7430,7 @@
             <a:normAutofit/>
           </a:bodyPr>
           <a:p>
-            <a:pPr marL="432000" indent="-324000" algn="ctr">
+            <a:pPr marL="432000" indent="-324000">
               <a:spcBef>
                 <a:spcPts val="1417"/>
               </a:spcBef>
@@ -7157,17 +7442,17 @@
               <a:buChar char=""/>
             </a:pPr>
             <a:r>
-              <a:rPr b="0" lang="en-US" sz="1800" spc="-1" strike="noStrike">
+              <a:rPr b="0" lang="en-US" sz="3200" spc="-1" strike="noStrike">
                 <a:latin typeface="Arial"/>
               </a:rPr>
               <a:t>Click to edit the outline text format</a:t>
             </a:r>
-            <a:endParaRPr b="0" lang="en-US" sz="1800" spc="-1" strike="noStrike">
-              <a:latin typeface="Arial"/>
-            </a:endParaRPr>
-          </a:p>
-          <a:p>
-            <a:pPr lvl="1" marL="864000" indent="-324000" algn="ctr">
+            <a:endParaRPr b="0" lang="en-US" sz="3200" spc="-1" strike="noStrike">
+              <a:latin typeface="Arial"/>
+            </a:endParaRPr>
+          </a:p>
+          <a:p>
+            <a:pPr lvl="1" marL="864000" indent="-324000">
               <a:spcBef>
                 <a:spcPts val="1134"/>
               </a:spcBef>
@@ -7179,17 +7464,17 @@
               <a:buChar char=""/>
             </a:pPr>
             <a:r>
-              <a:rPr b="0" lang="en-US" sz="1800" spc="-1" strike="noStrike">
+              <a:rPr b="0" lang="en-US" sz="2800" spc="-1" strike="noStrike">
                 <a:latin typeface="Arial"/>
               </a:rPr>
               <a:t>Second Outline Level</a:t>
             </a:r>
-            <a:endParaRPr b="0" lang="en-US" sz="1800" spc="-1" strike="noStrike">
-              <a:latin typeface="Arial"/>
-            </a:endParaRPr>
-          </a:p>
-          <a:p>
-            <a:pPr lvl="2" marL="1296000" indent="-288000" algn="ctr">
+            <a:endParaRPr b="0" lang="en-US" sz="2800" spc="-1" strike="noStrike">
+              <a:latin typeface="Arial"/>
+            </a:endParaRPr>
+          </a:p>
+          <a:p>
+            <a:pPr lvl="2" marL="1296000" indent="-288000">
               <a:spcBef>
                 <a:spcPts val="850"/>
               </a:spcBef>
@@ -7201,17 +7486,17 @@
               <a:buChar char=""/>
             </a:pPr>
             <a:r>
-              <a:rPr b="0" lang="en-US" sz="1800" spc="-1" strike="noStrike">
+              <a:rPr b="0" lang="en-US" sz="2400" spc="-1" strike="noStrike">
                 <a:latin typeface="Arial"/>
               </a:rPr>
               <a:t>Third Outline Level</a:t>
             </a:r>
-            <a:endParaRPr b="0" lang="en-US" sz="1800" spc="-1" strike="noStrike">
-              <a:latin typeface="Arial"/>
-            </a:endParaRPr>
-          </a:p>
-          <a:p>
-            <a:pPr lvl="3" marL="1728000" indent="-216000" algn="ctr">
+            <a:endParaRPr b="0" lang="en-US" sz="2400" spc="-1" strike="noStrike">
+              <a:latin typeface="Arial"/>
+            </a:endParaRPr>
+          </a:p>
+          <a:p>
+            <a:pPr lvl="3" marL="1728000" indent="-216000">
               <a:spcBef>
                 <a:spcPts val="567"/>
               </a:spcBef>
@@ -7223,17 +7508,17 @@
               <a:buChar char=""/>
             </a:pPr>
             <a:r>
-              <a:rPr b="0" lang="en-US" sz="1800" spc="-1" strike="noStrike">
+              <a:rPr b="0" lang="en-US" sz="2000" spc="-1" strike="noStrike">
                 <a:latin typeface="Arial"/>
               </a:rPr>
               <a:t>Fourth Outline Level</a:t>
             </a:r>
-            <a:endParaRPr b="0" lang="en-US" sz="1800" spc="-1" strike="noStrike">
-              <a:latin typeface="Arial"/>
-            </a:endParaRPr>
-          </a:p>
-          <a:p>
-            <a:pPr lvl="4" marL="2160000" indent="-216000" algn="ctr">
+            <a:endParaRPr b="0" lang="en-US" sz="2000" spc="-1" strike="noStrike">
+              <a:latin typeface="Arial"/>
+            </a:endParaRPr>
+          </a:p>
+          <a:p>
+            <a:pPr lvl="4" marL="2160000" indent="-216000">
               <a:spcBef>
                 <a:spcPts val="283"/>
               </a:spcBef>
@@ -7245,17 +7530,17 @@
               <a:buChar char=""/>
             </a:pPr>
             <a:r>
-              <a:rPr b="0" lang="en-US" sz="1800" spc="-1" strike="noStrike">
+              <a:rPr b="0" lang="en-US" sz="2000" spc="-1" strike="noStrike">
                 <a:latin typeface="Arial"/>
               </a:rPr>
               <a:t>Fifth Outline Level</a:t>
             </a:r>
-            <a:endParaRPr b="0" lang="en-US" sz="1800" spc="-1" strike="noStrike">
-              <a:latin typeface="Arial"/>
-            </a:endParaRPr>
-          </a:p>
-          <a:p>
-            <a:pPr lvl="5" marL="2592000" indent="-216000" algn="ctr">
+            <a:endParaRPr b="0" lang="en-US" sz="2000" spc="-1" strike="noStrike">
+              <a:latin typeface="Arial"/>
+            </a:endParaRPr>
+          </a:p>
+          <a:p>
+            <a:pPr lvl="5" marL="2592000" indent="-216000">
               <a:spcBef>
                 <a:spcPts val="283"/>
               </a:spcBef>
@@ -7267,17 +7552,17 @@
               <a:buChar char=""/>
             </a:pPr>
             <a:r>
-              <a:rPr b="0" lang="en-US" sz="1800" spc="-1" strike="noStrike">
+              <a:rPr b="0" lang="en-US" sz="2000" spc="-1" strike="noStrike">
                 <a:latin typeface="Arial"/>
               </a:rPr>
               <a:t>Sixth Outline Level</a:t>
             </a:r>
-            <a:endParaRPr b="0" lang="en-US" sz="1800" spc="-1" strike="noStrike">
-              <a:latin typeface="Arial"/>
-            </a:endParaRPr>
-          </a:p>
-          <a:p>
-            <a:pPr lvl="6" marL="3024000" indent="-216000" algn="ctr">
+            <a:endParaRPr b="0" lang="en-US" sz="2000" spc="-1" strike="noStrike">
+              <a:latin typeface="Arial"/>
+            </a:endParaRPr>
+          </a:p>
+          <a:p>
+            <a:pPr lvl="6" marL="3024000" indent="-216000">
               <a:spcBef>
                 <a:spcPts val="283"/>
               </a:spcBef>
@@ -7289,12 +7574,12 @@
               <a:buChar char=""/>
             </a:pPr>
             <a:r>
-              <a:rPr b="0" lang="en-US" sz="1800" spc="-1" strike="noStrike">
+              <a:rPr b="0" lang="en-US" sz="2000" spc="-1" strike="noStrike">
                 <a:latin typeface="Arial"/>
               </a:rPr>
               <a:t>Seventh Outline Level</a:t>
             </a:r>
-            <a:endParaRPr b="0" lang="en-US" sz="1800" spc="-1" strike="noStrike">
+            <a:endParaRPr b="0" lang="en-US" sz="2000" spc="-1" strike="noStrike">
               <a:latin typeface="Arial"/>
             </a:endParaRPr>
           </a:p>
@@ -7356,7 +7641,7 @@
         <p:spPr>
           <a:xfrm>
             <a:off x="529200" y="887760"/>
-            <a:ext cx="9066240" cy="5695920"/>
+            <a:ext cx="9065880" cy="5695560"/>
           </a:xfrm>
           <a:prstGeom prst="rect">
             <a:avLst/>
@@ -7437,7 +7722,7 @@
         <p:spPr>
           <a:xfrm>
             <a:off x="503640" y="109440"/>
-            <a:ext cx="9066240" cy="1260720"/>
+            <a:ext cx="9065880" cy="1260360"/>
           </a:xfrm>
           <a:prstGeom prst="rect">
             <a:avLst/>
@@ -7488,7 +7773,7 @@
         <p:spPr>
           <a:xfrm>
             <a:off x="503640" y="1769400"/>
-            <a:ext cx="9066240" cy="4384080"/>
+            <a:ext cx="9065880" cy="4383720"/>
           </a:xfrm>
           <a:prstGeom prst="rect">
             <a:avLst/>
@@ -7509,7 +7794,7 @@
             <a:normAutofit/>
           </a:bodyPr>
           <a:p>
-            <a:pPr marL="432000" indent="-322200">
+            <a:pPr marL="432000" indent="-321840">
               <a:lnSpc>
                 <a:spcPct val="100000"/>
               </a:lnSpc>
@@ -7538,7 +7823,7 @@
             </a:endParaRPr>
           </a:p>
           <a:p>
-            <a:pPr lvl="1" marL="864000" indent="-322200">
+            <a:pPr lvl="1" marL="864000" indent="-321840">
               <a:lnSpc>
                 <a:spcPct val="100000"/>
               </a:lnSpc>
@@ -7567,7 +7852,7 @@
             </a:endParaRPr>
           </a:p>
           <a:p>
-            <a:pPr lvl="1" marL="864000" indent="-322200">
+            <a:pPr lvl="1" marL="864000" indent="-321840">
               <a:lnSpc>
                 <a:spcPct val="100000"/>
               </a:lnSpc>
@@ -7596,7 +7881,7 @@
             </a:endParaRPr>
           </a:p>
           <a:p>
-            <a:pPr lvl="1" marL="864000" indent="-322200">
+            <a:pPr lvl="1" marL="864000" indent="-321840">
               <a:lnSpc>
                 <a:spcPct val="100000"/>
               </a:lnSpc>
@@ -7625,7 +7910,7 @@
             </a:endParaRPr>
           </a:p>
           <a:p>
-            <a:pPr lvl="1" marL="864000" indent="-322200">
+            <a:pPr lvl="1" marL="864000" indent="-321840">
               <a:lnSpc>
                 <a:spcPct val="100000"/>
               </a:lnSpc>
@@ -7654,7 +7939,7 @@
             </a:endParaRPr>
           </a:p>
           <a:p>
-            <a:pPr lvl="1" marL="864000" indent="-322200">
+            <a:pPr lvl="1" marL="864000" indent="-321840">
               <a:lnSpc>
                 <a:spcPct val="100000"/>
               </a:lnSpc>
@@ -7683,7 +7968,7 @@
             </a:endParaRPr>
           </a:p>
           <a:p>
-            <a:pPr lvl="1" marL="864000" indent="-322200">
+            <a:pPr lvl="1" marL="864000" indent="-321840">
               <a:lnSpc>
                 <a:spcPct val="100000"/>
               </a:lnSpc>
@@ -7752,7 +8037,7 @@
         <p:spPr>
           <a:xfrm>
             <a:off x="503640" y="109440"/>
-            <a:ext cx="9066240" cy="1260720"/>
+            <a:ext cx="9065880" cy="1260360"/>
           </a:xfrm>
           <a:prstGeom prst="rect">
             <a:avLst/>
@@ -7803,7 +8088,7 @@
         <p:spPr>
           <a:xfrm>
             <a:off x="503640" y="1769400"/>
-            <a:ext cx="9066240" cy="4384080"/>
+            <a:ext cx="9065880" cy="4383720"/>
           </a:xfrm>
           <a:prstGeom prst="rect">
             <a:avLst/>
@@ -7870,7 +8155,7 @@
             </a:endParaRPr>
           </a:p>
           <a:p>
-            <a:pPr lvl="4" marL="1080000" indent="-214920">
+            <a:pPr lvl="4" marL="1080000" indent="-214560">
               <a:lnSpc>
                 <a:spcPct val="100000"/>
               </a:lnSpc>
@@ -7899,7 +8184,7 @@
             </a:endParaRPr>
           </a:p>
           <a:p>
-            <a:pPr marL="432000" indent="-322200">
+            <a:pPr marL="432000" indent="-321840">
               <a:lnSpc>
                 <a:spcPct val="100000"/>
               </a:lnSpc>
@@ -7928,7 +8213,7 @@
             </a:endParaRPr>
           </a:p>
           <a:p>
-            <a:pPr lvl="3" marL="864000" indent="-214920">
+            <a:pPr lvl="3" marL="864000" indent="-214560">
               <a:lnSpc>
                 <a:spcPct val="100000"/>
               </a:lnSpc>
@@ -7997,7 +8282,7 @@
         <p:spPr>
           <a:xfrm>
             <a:off x="503640" y="301680"/>
-            <a:ext cx="9068400" cy="1261800"/>
+            <a:ext cx="9068040" cy="1261440"/>
           </a:xfrm>
           <a:prstGeom prst="rect">
             <a:avLst/>
@@ -8023,7 +8308,7 @@
         <p:spPr>
           <a:xfrm>
             <a:off x="503640" y="1769400"/>
-            <a:ext cx="9068400" cy="4385160"/>
+            <a:ext cx="9068040" cy="4384800"/>
           </a:xfrm>
           <a:prstGeom prst="rect">
             <a:avLst/>
@@ -8048,8 +8333,8 @@
         </p:nvSpPr>
         <p:spPr>
           <a:xfrm>
-            <a:off x="503640" y="301680"/>
-            <a:ext cx="9068400" cy="1261800"/>
+            <a:off x="503640" y="182880"/>
+            <a:ext cx="9068040" cy="1261440"/>
           </a:xfrm>
           <a:prstGeom prst="rect">
             <a:avLst/>
@@ -8076,12 +8361,19 @@
               </a:lnSpc>
             </a:pPr>
             <a:r>
-              <a:rPr b="0" lang="en-US" sz="4400" spc="-1" strike="noStrike">
+              <a:rPr b="0" i="1" lang="en-US" sz="4400" spc="-1" strike="noStrike">
+                <a:solidFill>
+                  <a:srgbClr val="ffffff"/>
+                </a:solidFill>
                 <a:latin typeface="Arial"/>
+                <a:ea typeface="DejaVu Sans"/>
               </a:rPr>
               <a:t>Kreiranje novog projekta</a:t>
             </a:r>
-            <a:endParaRPr b="0" lang="en-US" sz="4400" spc="-1" strike="noStrike">
+            <a:endParaRPr b="0" i="1" lang="en-US" sz="4400" spc="-1" strike="noStrike">
+              <a:solidFill>
+                <a:srgbClr val="ffffff"/>
+              </a:solidFill>
               <a:latin typeface="Arial"/>
             </a:endParaRPr>
           </a:p>
@@ -8095,8 +8387,8 @@
         </p:nvSpPr>
         <p:spPr>
           <a:xfrm>
-            <a:off x="503640" y="1769400"/>
-            <a:ext cx="9068400" cy="4385160"/>
+            <a:off x="365760" y="1833120"/>
+            <a:ext cx="6720120" cy="4384800"/>
           </a:xfrm>
           <a:prstGeom prst="rect">
             <a:avLst/>
@@ -8114,10 +8406,10 @@
         </p:style>
         <p:txBody>
           <a:bodyPr lIns="0" rIns="0" tIns="0" bIns="0">
-            <a:normAutofit/>
-          </a:bodyPr>
-          <a:p>
-            <a:pPr marL="432000" indent="-323640">
+            <a:normAutofit fontScale="91000"/>
+          </a:bodyPr>
+          <a:p>
+            <a:pPr marL="432000" indent="-323280">
               <a:lnSpc>
                 <a:spcPct val="100000"/>
               </a:lnSpc>
@@ -8133,7 +8425,11 @@
             </a:pPr>
             <a:r>
               <a:rPr b="0" lang="en-US" sz="3200" spc="-1" strike="noStrike">
+                <a:solidFill>
+                  <a:srgbClr val="000000"/>
+                </a:solidFill>
                 <a:latin typeface="Arial"/>
+                <a:ea typeface="DejaVu Sans"/>
               </a:rPr>
               <a:t>Komanda: micro new &lt;naziv projekta&gt;</a:t>
             </a:r>
@@ -8142,7 +8438,7 @@
             </a:endParaRPr>
           </a:p>
           <a:p>
-            <a:pPr marL="432000" indent="-323640">
+            <a:pPr marL="432000" indent="-323280">
               <a:lnSpc>
                 <a:spcPct val="100000"/>
               </a:lnSpc>
@@ -8158,7 +8454,11 @@
             </a:pPr>
             <a:r>
               <a:rPr b="0" lang="en-US" sz="3200" spc="-1" strike="noStrike">
+                <a:solidFill>
+                  <a:srgbClr val="000000"/>
+                </a:solidFill>
                 <a:latin typeface="Arial"/>
+                <a:ea typeface="DejaVu Sans"/>
               </a:rPr>
               <a:t>U main fajlu kreira servis, registruje handlere za taj servis, inicira servis I pokrece servis</a:t>
             </a:r>
@@ -8167,7 +8467,7 @@
             </a:endParaRPr>
           </a:p>
           <a:p>
-            <a:pPr marL="432000" indent="-323640">
+            <a:pPr marL="432000" indent="-323280">
               <a:lnSpc>
                 <a:spcPct val="100000"/>
               </a:lnSpc>
@@ -8183,7 +8483,11 @@
             </a:pPr>
             <a:r>
               <a:rPr b="0" lang="en-US" sz="3200" spc="-1" strike="noStrike">
+                <a:solidFill>
+                  <a:srgbClr val="000000"/>
+                </a:solidFill>
                 <a:latin typeface="Arial"/>
+                <a:ea typeface="DejaVu Sans"/>
               </a:rPr>
               <a:t>Servis interfejs se definise u .proto fajlu kao i argumenti funkcija</a:t>
             </a:r>
@@ -8192,7 +8496,7 @@
             </a:endParaRPr>
           </a:p>
           <a:p>
-            <a:pPr marL="432000" indent="-323640">
+            <a:pPr marL="432000" indent="-323280">
               <a:lnSpc>
                 <a:spcPct val="100000"/>
               </a:lnSpc>
@@ -8208,7 +8512,11 @@
             </a:pPr>
             <a:r>
               <a:rPr b="0" lang="en-US" sz="3200" spc="-1" strike="noStrike">
+                <a:solidFill>
+                  <a:srgbClr val="000000"/>
+                </a:solidFill>
                 <a:latin typeface="Arial"/>
+                <a:ea typeface="DejaVu Sans"/>
               </a:rPr>
               <a:t>U handleru je potrebno implemenitrati nas interfejs</a:t>
             </a:r>
@@ -8218,6 +8526,1230 @@
           </a:p>
         </p:txBody>
       </p:sp>
+      <p:pic>
+        <p:nvPicPr>
+          <p:cNvPr id="183" name="" descr=""/>
+          <p:cNvPicPr/>
+          <p:nvPr/>
+        </p:nvPicPr>
+        <p:blipFill>
+          <a:blip r:embed="rId1"/>
+          <a:stretch/>
+        </p:blipFill>
+        <p:spPr>
+          <a:xfrm>
+            <a:off x="7264080" y="2484360"/>
+            <a:ext cx="2428560" cy="2819160"/>
+          </a:xfrm>
+          <a:prstGeom prst="rect">
+            <a:avLst/>
+          </a:prstGeom>
+          <a:ln>
+            <a:noFill/>
+          </a:ln>
+        </p:spPr>
+      </p:pic>
+    </p:spTree>
+  </p:cSld>
+  <mc:AlternateContent>
+    <mc:Choice Requires="p14">
+      <p:transition spd="slow" p14:dur="2000"/>
+    </mc:Choice>
+    <mc:Fallback>
+      <p:transition spd="slow"/>
+    </mc:Fallback>
+  </mc:AlternateContent>
+</p:sld>
+</file>
+
+<file path=ppt/slides/slide13.xml><?xml version="1.0" encoding="utf-8"?>
+<p:sld xmlns:a="http://schemas.openxmlformats.org/drawingml/2006/main" xmlns:p="http://schemas.openxmlformats.org/presentationml/2006/main" xmlns:r="http://schemas.openxmlformats.org/officeDocument/2006/relationships" xmlns:p14="http://schemas.microsoft.com/office/powerpoint/2010/main" xmlns:p15="http://schemas.microsoft.com/office/powerpoint/2012/main" xmlns:mc="http://schemas.openxmlformats.org/markup-compatibility/2006">
+  <p:cSld>
+    <p:spTree>
+      <p:nvGrpSpPr>
+        <p:cNvPr id="1" name=""/>
+        <p:cNvGrpSpPr/>
+        <p:nvPr/>
+      </p:nvGrpSpPr>
+      <p:grpSpPr>
+        <a:xfrm>
+          <a:off x="0" y="0"/>
+          <a:ext cx="0" cy="0"/>
+          <a:chOff x="0" y="0"/>
+          <a:chExt cx="0" cy="0"/>
+        </a:xfrm>
+      </p:grpSpPr>
+      <p:sp>
+        <p:nvSpPr>
+          <p:cNvPr id="184" name="TextShape 1"/>
+          <p:cNvSpPr txBox="1"/>
+          <p:nvPr/>
+        </p:nvSpPr>
+        <p:spPr>
+          <a:xfrm>
+            <a:off x="503640" y="301680"/>
+            <a:ext cx="9069120" cy="1262520"/>
+          </a:xfrm>
+          <a:prstGeom prst="rect">
+            <a:avLst/>
+          </a:prstGeom>
+          <a:noFill/>
+          <a:ln>
+            <a:noFill/>
+          </a:ln>
+        </p:spPr>
+        <p:txBody>
+          <a:bodyPr lIns="0" rIns="0" tIns="0" bIns="0" anchor="ctr">
+            <a:noAutofit/>
+          </a:bodyPr>
+          <a:p>
+            <a:pPr algn="ctr"/>
+            <a:r>
+              <a:rPr b="0" i="1" lang="en-US" sz="4400" spc="-1" strike="noStrike">
+                <a:solidFill>
+                  <a:srgbClr val="ffffff"/>
+                </a:solidFill>
+                <a:latin typeface="Arial"/>
+              </a:rPr>
+              <a:t>Opcije za kreiranje servisa</a:t>
+            </a:r>
+            <a:endParaRPr b="0" i="1" lang="en-US" sz="4400" spc="-1" strike="noStrike">
+              <a:solidFill>
+                <a:srgbClr val="ffffff"/>
+              </a:solidFill>
+              <a:latin typeface="Arial"/>
+            </a:endParaRPr>
+          </a:p>
+        </p:txBody>
+      </p:sp>
+      <p:sp>
+        <p:nvSpPr>
+          <p:cNvPr id="185" name="TextShape 2"/>
+          <p:cNvSpPr txBox="1"/>
+          <p:nvPr/>
+        </p:nvSpPr>
+        <p:spPr>
+          <a:xfrm>
+            <a:off x="91440" y="1769400"/>
+            <a:ext cx="5394960" cy="4997160"/>
+          </a:xfrm>
+          <a:prstGeom prst="rect">
+            <a:avLst/>
+          </a:prstGeom>
+          <a:noFill/>
+          <a:ln>
+            <a:noFill/>
+          </a:ln>
+        </p:spPr>
+        <p:txBody>
+          <a:bodyPr lIns="0" rIns="0" tIns="0" bIns="0">
+            <a:normAutofit fontScale="70000"/>
+          </a:bodyPr>
+          <a:p>
+            <a:pPr marL="432000" indent="-324000">
+              <a:spcBef>
+                <a:spcPts val="1417"/>
+              </a:spcBef>
+              <a:buClr>
+                <a:srgbClr val="000000"/>
+              </a:buClr>
+              <a:buSzPct val="45000"/>
+              <a:buFont typeface="Wingdings" charset="2"/>
+              <a:buChar char=""/>
+            </a:pPr>
+            <a:r>
+              <a:rPr b="0" lang="en-US" sz="1700" spc="-1" strike="noStrike">
+                <a:solidFill>
+                  <a:srgbClr val="c9211e"/>
+                </a:solidFill>
+                <a:latin typeface="Arial"/>
+              </a:rPr>
+              <a:t>Micro.Name (n string) Option</a:t>
+            </a:r>
+            <a:endParaRPr b="0" lang="en-US" sz="1700" spc="-1" strike="noStrike">
+              <a:latin typeface="Arial"/>
+            </a:endParaRPr>
+          </a:p>
+          <a:p>
+            <a:pPr marL="432000" indent="-324000">
+              <a:spcBef>
+                <a:spcPts val="1417"/>
+              </a:spcBef>
+              <a:buClr>
+                <a:srgbClr val="000000"/>
+              </a:buClr>
+              <a:buSzPct val="45000"/>
+              <a:buFont typeface="Wingdings" charset="2"/>
+              <a:buChar char=""/>
+            </a:pPr>
+            <a:r>
+              <a:rPr b="0" lang="en-US" sz="1700" spc="-1" strike="noStrike">
+                <a:latin typeface="Arial"/>
+              </a:rPr>
+              <a:t>Micro.Version(v string) Option</a:t>
+            </a:r>
+            <a:endParaRPr b="0" lang="en-US" sz="1700" spc="-1" strike="noStrike">
+              <a:latin typeface="Arial"/>
+            </a:endParaRPr>
+          </a:p>
+          <a:p>
+            <a:pPr marL="432000" indent="-324000">
+              <a:spcBef>
+                <a:spcPts val="1417"/>
+              </a:spcBef>
+              <a:buClr>
+                <a:srgbClr val="000000"/>
+              </a:buClr>
+              <a:buSzPct val="45000"/>
+              <a:buFont typeface="Wingdings" charset="2"/>
+              <a:buChar char=""/>
+            </a:pPr>
+            <a:r>
+              <a:rPr b="0" lang="en-US" sz="1700" spc="-1" strike="noStrike">
+                <a:latin typeface="Arial"/>
+              </a:rPr>
+              <a:t>Micro.Address(addr string) Option</a:t>
+            </a:r>
+            <a:endParaRPr b="0" lang="en-US" sz="1700" spc="-1" strike="noStrike">
+              <a:latin typeface="Arial"/>
+            </a:endParaRPr>
+          </a:p>
+          <a:p>
+            <a:pPr marL="432000" indent="-324000">
+              <a:spcBef>
+                <a:spcPts val="1417"/>
+              </a:spcBef>
+              <a:buClr>
+                <a:srgbClr val="000000"/>
+              </a:buClr>
+              <a:buSzPct val="45000"/>
+              <a:buFont typeface="Wingdings" charset="2"/>
+              <a:buChar char=""/>
+            </a:pPr>
+            <a:r>
+              <a:rPr b="0" lang="en-US" sz="1700" spc="-1" strike="noStrike">
+                <a:latin typeface="Arial"/>
+              </a:rPr>
+              <a:t>Micro.RegisterTTL(t time.Duration) Option</a:t>
+            </a:r>
+            <a:endParaRPr b="0" lang="en-US" sz="1700" spc="-1" strike="noStrike">
+              <a:latin typeface="Arial"/>
+            </a:endParaRPr>
+          </a:p>
+          <a:p>
+            <a:pPr marL="432000" indent="-324000">
+              <a:spcBef>
+                <a:spcPts val="1417"/>
+              </a:spcBef>
+              <a:buClr>
+                <a:srgbClr val="000000"/>
+              </a:buClr>
+              <a:buSzPct val="45000"/>
+              <a:buFont typeface="Wingdings" charset="2"/>
+              <a:buChar char=""/>
+            </a:pPr>
+            <a:r>
+              <a:rPr b="0" lang="en-US" sz="1700" spc="-1" strike="noStrike">
+                <a:latin typeface="Arial"/>
+              </a:rPr>
+              <a:t>Micro.RegisterInterval(t.time.Duration) Option</a:t>
+            </a:r>
+            <a:endParaRPr b="0" lang="en-US" sz="1700" spc="-1" strike="noStrike">
+              <a:latin typeface="Arial"/>
+            </a:endParaRPr>
+          </a:p>
+          <a:p>
+            <a:pPr marL="432000" indent="-324000">
+              <a:spcBef>
+                <a:spcPts val="1417"/>
+              </a:spcBef>
+              <a:buClr>
+                <a:srgbClr val="000000"/>
+              </a:buClr>
+              <a:buSzPct val="45000"/>
+              <a:buFont typeface="Wingdings" charset="2"/>
+              <a:buChar char=""/>
+            </a:pPr>
+            <a:r>
+              <a:rPr b="0" lang="en-US" sz="1700" spc="-1" strike="noStrike">
+                <a:latin typeface="Arial"/>
+              </a:rPr>
+              <a:t>Micro.WrapHandler(w ...server.HandlerWrapper) Option</a:t>
+            </a:r>
+            <a:endParaRPr b="0" lang="en-US" sz="1700" spc="-1" strike="noStrike">
+              <a:latin typeface="Arial"/>
+            </a:endParaRPr>
+          </a:p>
+          <a:p>
+            <a:pPr marL="432000" indent="-324000">
+              <a:spcBef>
+                <a:spcPts val="1417"/>
+              </a:spcBef>
+              <a:buClr>
+                <a:srgbClr val="000000"/>
+              </a:buClr>
+              <a:buSzPct val="45000"/>
+              <a:buFont typeface="Wingdings" charset="2"/>
+              <a:buChar char=""/>
+            </a:pPr>
+            <a:r>
+              <a:rPr b="0" lang="en-US" sz="1700" spc="-1" strike="noStrike">
+                <a:latin typeface="Arial"/>
+              </a:rPr>
+              <a:t>Micro.wrapSubscriber(w… server.SubscriberWrapper) Option</a:t>
+            </a:r>
+            <a:endParaRPr b="0" lang="en-US" sz="1700" spc="-1" strike="noStrike">
+              <a:latin typeface="Arial"/>
+            </a:endParaRPr>
+          </a:p>
+          <a:p>
+            <a:pPr marL="432000" indent="-324000">
+              <a:spcBef>
+                <a:spcPts val="1417"/>
+              </a:spcBef>
+              <a:buClr>
+                <a:srgbClr val="000000"/>
+              </a:buClr>
+              <a:buSzPct val="45000"/>
+              <a:buFont typeface="Wingdings" charset="2"/>
+              <a:buChar char=""/>
+            </a:pPr>
+            <a:r>
+              <a:rPr b="0" lang="en-US" sz="1700" spc="-1" strike="noStrike">
+                <a:latin typeface="Arial"/>
+              </a:rPr>
+              <a:t>Micro.WrapCall(w...client.CallWrapper) Option</a:t>
+            </a:r>
+            <a:endParaRPr b="0" lang="en-US" sz="1700" spc="-1" strike="noStrike">
+              <a:latin typeface="Arial"/>
+            </a:endParaRPr>
+          </a:p>
+          <a:p>
+            <a:pPr marL="432000" indent="-324000">
+              <a:spcBef>
+                <a:spcPts val="1417"/>
+              </a:spcBef>
+              <a:buClr>
+                <a:srgbClr val="000000"/>
+              </a:buClr>
+              <a:buSzPct val="45000"/>
+              <a:buFont typeface="Wingdings" charset="2"/>
+              <a:buChar char=""/>
+            </a:pPr>
+            <a:r>
+              <a:rPr b="0" lang="en-US" sz="1700" spc="-1" strike="noStrike">
+                <a:latin typeface="Arial"/>
+              </a:rPr>
+              <a:t>Micro.WrapClient(w...client.Wrapper) Option</a:t>
+            </a:r>
+            <a:endParaRPr b="0" lang="en-US" sz="1700" spc="-1" strike="noStrike">
+              <a:latin typeface="Arial"/>
+            </a:endParaRPr>
+          </a:p>
+          <a:p>
+            <a:pPr marL="432000" indent="-324000">
+              <a:spcBef>
+                <a:spcPts val="1417"/>
+              </a:spcBef>
+              <a:buClr>
+                <a:srgbClr val="000000"/>
+              </a:buClr>
+              <a:buSzPct val="45000"/>
+              <a:buFont typeface="Wingdings" charset="2"/>
+              <a:buChar char=""/>
+            </a:pPr>
+            <a:r>
+              <a:rPr b="0" lang="en-US" sz="1700" spc="-1" strike="noStrike">
+                <a:latin typeface="Arial"/>
+              </a:rPr>
+              <a:t>Micro.BeforeStart(fn func() error) Option</a:t>
+            </a:r>
+            <a:endParaRPr b="0" lang="en-US" sz="1700" spc="-1" strike="noStrike">
+              <a:latin typeface="Arial"/>
+            </a:endParaRPr>
+          </a:p>
+          <a:p>
+            <a:pPr marL="432000" indent="-324000">
+              <a:spcBef>
+                <a:spcPts val="1417"/>
+              </a:spcBef>
+              <a:buClr>
+                <a:srgbClr val="000000"/>
+              </a:buClr>
+              <a:buSzPct val="45000"/>
+              <a:buFont typeface="Wingdings" charset="2"/>
+              <a:buChar char=""/>
+            </a:pPr>
+            <a:r>
+              <a:rPr b="0" lang="en-US" sz="1700" spc="-1" strike="noStrike">
+                <a:latin typeface="Arial"/>
+              </a:rPr>
+              <a:t>Micro.BeforeStop(fn func() error) Option</a:t>
+            </a:r>
+            <a:endParaRPr b="0" lang="en-US" sz="1700" spc="-1" strike="noStrike">
+              <a:latin typeface="Arial"/>
+            </a:endParaRPr>
+          </a:p>
+          <a:p>
+            <a:pPr marL="432000" indent="-324000">
+              <a:spcBef>
+                <a:spcPts val="1417"/>
+              </a:spcBef>
+              <a:buClr>
+                <a:srgbClr val="000000"/>
+              </a:buClr>
+              <a:buSzPct val="45000"/>
+              <a:buFont typeface="Wingdings" charset="2"/>
+              <a:buChar char=""/>
+            </a:pPr>
+            <a:r>
+              <a:rPr b="0" lang="en-US" sz="1700" spc="-1" strike="noStrike">
+                <a:latin typeface="Arial"/>
+              </a:rPr>
+              <a:t>Micro.AfterStart(fn func() error) Option</a:t>
+            </a:r>
+            <a:endParaRPr b="0" lang="en-US" sz="1700" spc="-1" strike="noStrike">
+              <a:latin typeface="Arial"/>
+            </a:endParaRPr>
+          </a:p>
+          <a:p>
+            <a:pPr marL="432000" indent="-324000">
+              <a:spcBef>
+                <a:spcPts val="1417"/>
+              </a:spcBef>
+              <a:buClr>
+                <a:srgbClr val="000000"/>
+              </a:buClr>
+              <a:buSzPct val="45000"/>
+              <a:buFont typeface="Wingdings" charset="2"/>
+              <a:buChar char=""/>
+            </a:pPr>
+            <a:r>
+              <a:rPr b="0" lang="en-US" sz="1700" spc="-1" strike="noStrike">
+                <a:latin typeface="Arial"/>
+              </a:rPr>
+              <a:t>Micro.Action(a func(*cli.Context)) Option</a:t>
+            </a:r>
+            <a:endParaRPr b="0" lang="en-US" sz="1700" spc="-1" strike="noStrike">
+              <a:latin typeface="Arial"/>
+            </a:endParaRPr>
+          </a:p>
+          <a:p>
+            <a:pPr marL="432000" indent="-324000">
+              <a:spcBef>
+                <a:spcPts val="1417"/>
+              </a:spcBef>
+              <a:buClr>
+                <a:srgbClr val="000000"/>
+              </a:buClr>
+              <a:buSzPct val="45000"/>
+              <a:buFont typeface="Wingdings" charset="2"/>
+              <a:buChar char=""/>
+            </a:pPr>
+            <a:r>
+              <a:rPr b="0" lang="en-US" sz="1700" spc="-1" strike="noStrike">
+                <a:latin typeface="Arial"/>
+              </a:rPr>
+              <a:t>Micro.Flags(flags ..cli.Flag) Option</a:t>
+            </a:r>
+            <a:endParaRPr b="0" lang="en-US" sz="1700" spc="-1" strike="noStrike">
+              <a:latin typeface="Arial"/>
+            </a:endParaRPr>
+          </a:p>
+        </p:txBody>
+      </p:sp>
+      <p:sp>
+        <p:nvSpPr>
+          <p:cNvPr id="186" name="TextShape 3"/>
+          <p:cNvSpPr txBox="1"/>
+          <p:nvPr/>
+        </p:nvSpPr>
+        <p:spPr>
+          <a:xfrm>
+            <a:off x="5577840" y="1769760"/>
+            <a:ext cx="4937760" cy="5728320"/>
+          </a:xfrm>
+          <a:prstGeom prst="rect">
+            <a:avLst/>
+          </a:prstGeom>
+          <a:noFill/>
+          <a:ln>
+            <a:noFill/>
+          </a:ln>
+        </p:spPr>
+        <p:txBody>
+          <a:bodyPr lIns="0" rIns="0" tIns="0" bIns="0">
+            <a:normAutofit/>
+          </a:bodyPr>
+          <a:p>
+            <a:pPr marL="432000" indent="-324000">
+              <a:spcBef>
+                <a:spcPts val="1417"/>
+              </a:spcBef>
+              <a:buClr>
+                <a:srgbClr val="000000"/>
+              </a:buClr>
+              <a:buSzPct val="45000"/>
+              <a:buFont typeface="Wingdings" charset="2"/>
+              <a:buChar char=""/>
+            </a:pPr>
+            <a:r>
+              <a:rPr b="0" lang="en-US" sz="1500" spc="-1" strike="noStrike">
+                <a:latin typeface="Arial"/>
+              </a:rPr>
+              <a:t>Micro.MetaData(md map[string] string) Option</a:t>
+            </a:r>
+            <a:endParaRPr b="0" lang="en-US" sz="1500" spc="-1" strike="noStrike">
+              <a:latin typeface="Arial"/>
+            </a:endParaRPr>
+          </a:p>
+          <a:p>
+            <a:pPr marL="432000" indent="-324000">
+              <a:spcBef>
+                <a:spcPts val="1417"/>
+              </a:spcBef>
+              <a:buClr>
+                <a:srgbClr val="000000"/>
+              </a:buClr>
+              <a:buSzPct val="45000"/>
+              <a:buFont typeface="Wingdings" charset="2"/>
+              <a:buChar char=""/>
+            </a:pPr>
+            <a:r>
+              <a:rPr b="0" lang="en-US" sz="1500" spc="-1" strike="noStrike">
+                <a:solidFill>
+                  <a:srgbClr val="c9211e"/>
+                </a:solidFill>
+                <a:latin typeface="Arial"/>
+              </a:rPr>
+              <a:t>Micro.Transport (t transport.Transport) Option</a:t>
+            </a:r>
+            <a:endParaRPr b="0" lang="en-US" sz="1500" spc="-1" strike="noStrike">
+              <a:latin typeface="Arial"/>
+            </a:endParaRPr>
+          </a:p>
+          <a:p>
+            <a:pPr marL="432000" indent="-324000">
+              <a:spcBef>
+                <a:spcPts val="1417"/>
+              </a:spcBef>
+              <a:buClr>
+                <a:srgbClr val="000000"/>
+              </a:buClr>
+              <a:buSzPct val="45000"/>
+              <a:buFont typeface="Wingdings" charset="2"/>
+              <a:buChar char=""/>
+            </a:pPr>
+            <a:r>
+              <a:rPr b="0" lang="en-US" sz="1500" spc="-1" strike="noStrike">
+                <a:solidFill>
+                  <a:srgbClr val="c9211e"/>
+                </a:solidFill>
+                <a:latin typeface="Arial"/>
+              </a:rPr>
+              <a:t>Micro.Selector( s selector.Selector) Option</a:t>
+            </a:r>
+            <a:endParaRPr b="0" lang="en-US" sz="1500" spc="-1" strike="noStrike">
+              <a:latin typeface="Arial"/>
+            </a:endParaRPr>
+          </a:p>
+          <a:p>
+            <a:pPr marL="432000" indent="-324000">
+              <a:spcBef>
+                <a:spcPts val="1417"/>
+              </a:spcBef>
+              <a:buClr>
+                <a:srgbClr val="000000"/>
+              </a:buClr>
+              <a:buSzPct val="45000"/>
+              <a:buFont typeface="Wingdings" charset="2"/>
+              <a:buChar char=""/>
+            </a:pPr>
+            <a:r>
+              <a:rPr b="0" lang="en-US" sz="1500" spc="-1" strike="noStrike">
+                <a:solidFill>
+                  <a:srgbClr val="c9211e"/>
+                </a:solidFill>
+                <a:latin typeface="Arial"/>
+              </a:rPr>
+              <a:t>Micro.Registry( r registry.Registry) Option</a:t>
+            </a:r>
+            <a:endParaRPr b="0" lang="en-US" sz="1500" spc="-1" strike="noStrike">
+              <a:latin typeface="Arial"/>
+            </a:endParaRPr>
+          </a:p>
+          <a:p>
+            <a:pPr marL="432000" indent="-324000">
+              <a:spcBef>
+                <a:spcPts val="1417"/>
+              </a:spcBef>
+              <a:buClr>
+                <a:srgbClr val="000000"/>
+              </a:buClr>
+              <a:buSzPct val="45000"/>
+              <a:buFont typeface="Wingdings" charset="2"/>
+              <a:buChar char=""/>
+            </a:pPr>
+            <a:r>
+              <a:rPr b="0" lang="en-US" sz="1500" spc="-1" strike="noStrike">
+                <a:solidFill>
+                  <a:srgbClr val="c9211e"/>
+                </a:solidFill>
+                <a:latin typeface="Arial"/>
+              </a:rPr>
+              <a:t>Micro.Server( s Server.Server) Option</a:t>
+            </a:r>
+            <a:endParaRPr b="0" lang="en-US" sz="1500" spc="-1" strike="noStrike">
+              <a:latin typeface="Arial"/>
+            </a:endParaRPr>
+          </a:p>
+          <a:p>
+            <a:pPr marL="432000" indent="-324000">
+              <a:spcBef>
+                <a:spcPts val="1417"/>
+              </a:spcBef>
+              <a:buClr>
+                <a:srgbClr val="000000"/>
+              </a:buClr>
+              <a:buSzPct val="45000"/>
+              <a:buFont typeface="Wingdings" charset="2"/>
+              <a:buChar char=""/>
+            </a:pPr>
+            <a:r>
+              <a:rPr b="0" lang="en-US" sz="1500" spc="-1" strike="noStrike">
+                <a:latin typeface="Arial"/>
+              </a:rPr>
+              <a:t>Micro.HandleSIgnal(b bool) Option</a:t>
+            </a:r>
+            <a:endParaRPr b="0" lang="en-US" sz="1500" spc="-1" strike="noStrike">
+              <a:latin typeface="Arial"/>
+            </a:endParaRPr>
+          </a:p>
+          <a:p>
+            <a:pPr marL="432000" indent="-324000">
+              <a:spcBef>
+                <a:spcPts val="1417"/>
+              </a:spcBef>
+              <a:buClr>
+                <a:srgbClr val="000000"/>
+              </a:buClr>
+              <a:buSzPct val="45000"/>
+              <a:buFont typeface="Wingdings" charset="2"/>
+              <a:buChar char=""/>
+            </a:pPr>
+            <a:r>
+              <a:rPr b="0" lang="en-US" sz="1500" spc="-1" strike="noStrike">
+                <a:latin typeface="Arial"/>
+              </a:rPr>
+              <a:t>Micro.Context(ctx context.Context) Option</a:t>
+            </a:r>
+            <a:endParaRPr b="0" lang="en-US" sz="1500" spc="-1" strike="noStrike">
+              <a:latin typeface="Arial"/>
+            </a:endParaRPr>
+          </a:p>
+          <a:p>
+            <a:pPr marL="432000" indent="-324000">
+              <a:spcBef>
+                <a:spcPts val="1417"/>
+              </a:spcBef>
+              <a:buClr>
+                <a:srgbClr val="000000"/>
+              </a:buClr>
+              <a:buSzPct val="45000"/>
+              <a:buFont typeface="Wingdings" charset="2"/>
+              <a:buChar char=""/>
+            </a:pPr>
+            <a:r>
+              <a:rPr b="0" lang="en-US" sz="1500" spc="-1" strike="noStrike">
+                <a:latin typeface="Arial"/>
+              </a:rPr>
+              <a:t>Micro.Client(c client.Client) Option</a:t>
+            </a:r>
+            <a:endParaRPr b="0" lang="en-US" sz="1500" spc="-1" strike="noStrike">
+              <a:latin typeface="Arial"/>
+            </a:endParaRPr>
+          </a:p>
+          <a:p>
+            <a:pPr marL="432000" indent="-324000">
+              <a:spcBef>
+                <a:spcPts val="1417"/>
+              </a:spcBef>
+              <a:buClr>
+                <a:srgbClr val="000000"/>
+              </a:buClr>
+              <a:buSzPct val="45000"/>
+              <a:buFont typeface="Wingdings" charset="2"/>
+              <a:buChar char=""/>
+            </a:pPr>
+            <a:r>
+              <a:rPr b="0" lang="en-US" sz="1500" spc="-1" strike="noStrike">
+                <a:solidFill>
+                  <a:srgbClr val="c9211e"/>
+                </a:solidFill>
+                <a:latin typeface="Arial"/>
+              </a:rPr>
+              <a:t>Micro.Broker(b broker.Broker) Option</a:t>
+            </a:r>
+            <a:endParaRPr b="0" lang="en-US" sz="1500" spc="-1" strike="noStrike">
+              <a:latin typeface="Arial"/>
+            </a:endParaRPr>
+          </a:p>
+          <a:p>
+            <a:pPr marL="432000" indent="-324000">
+              <a:spcBef>
+                <a:spcPts val="1417"/>
+              </a:spcBef>
+              <a:buClr>
+                <a:srgbClr val="000000"/>
+              </a:buClr>
+              <a:buSzPct val="45000"/>
+              <a:buFont typeface="Wingdings" charset="2"/>
+              <a:buChar char=""/>
+            </a:pPr>
+            <a:r>
+              <a:rPr b="0" lang="en-US" sz="1500" spc="-1" strike="noStrike">
+                <a:latin typeface="Arial"/>
+              </a:rPr>
+              <a:t>Micro.Tracer(t trace.Tracer) Option</a:t>
+            </a:r>
+            <a:endParaRPr b="0" lang="en-US" sz="1500" spc="-1" strike="noStrike">
+              <a:latin typeface="Arial"/>
+            </a:endParaRPr>
+          </a:p>
+          <a:p>
+            <a:pPr marL="432000" indent="-324000">
+              <a:spcBef>
+                <a:spcPts val="1417"/>
+              </a:spcBef>
+              <a:buClr>
+                <a:srgbClr val="000000"/>
+              </a:buClr>
+              <a:buSzPct val="45000"/>
+              <a:buFont typeface="Wingdings" charset="2"/>
+              <a:buChar char=""/>
+            </a:pPr>
+            <a:r>
+              <a:rPr b="0" lang="en-US" sz="1500" spc="-1" strike="noStrike">
+                <a:latin typeface="Arial"/>
+              </a:rPr>
+              <a:t>Micro.Auth(a auth.Auth) Option</a:t>
+            </a:r>
+            <a:endParaRPr b="0" lang="en-US" sz="1500" spc="-1" strike="noStrike">
+              <a:latin typeface="Arial"/>
+            </a:endParaRPr>
+          </a:p>
+          <a:p>
+            <a:pPr marL="432000" indent="-324000">
+              <a:spcBef>
+                <a:spcPts val="1417"/>
+              </a:spcBef>
+              <a:buClr>
+                <a:srgbClr val="000000"/>
+              </a:buClr>
+              <a:buSzPct val="45000"/>
+              <a:buFont typeface="Wingdings" charset="2"/>
+              <a:buChar char=""/>
+            </a:pPr>
+            <a:r>
+              <a:rPr b="0" lang="en-US" sz="1500" spc="-1" strike="noStrike">
+                <a:latin typeface="Arial"/>
+              </a:rPr>
+              <a:t>Micro.Cmd(c cmd.Cmd) Option</a:t>
+            </a:r>
+            <a:endParaRPr b="0" lang="en-US" sz="1500" spc="-1" strike="noStrike">
+              <a:latin typeface="Arial"/>
+            </a:endParaRPr>
+          </a:p>
+        </p:txBody>
+      </p:sp>
+    </p:spTree>
+  </p:cSld>
+  <mc:AlternateContent>
+    <mc:Choice Requires="p14">
+      <p:transition spd="slow" p14:dur="2000"/>
+    </mc:Choice>
+    <mc:Fallback>
+      <p:transition spd="slow"/>
+    </mc:Fallback>
+  </mc:AlternateContent>
+</p:sld>
+</file>
+
+<file path=ppt/slides/slide14.xml><?xml version="1.0" encoding="utf-8"?>
+<p:sld xmlns:a="http://schemas.openxmlformats.org/drawingml/2006/main" xmlns:p="http://schemas.openxmlformats.org/presentationml/2006/main" xmlns:r="http://schemas.openxmlformats.org/officeDocument/2006/relationships" xmlns:p14="http://schemas.microsoft.com/office/powerpoint/2010/main" xmlns:p15="http://schemas.microsoft.com/office/powerpoint/2012/main" xmlns:mc="http://schemas.openxmlformats.org/markup-compatibility/2006">
+  <p:cSld>
+    <p:spTree>
+      <p:nvGrpSpPr>
+        <p:cNvPr id="1" name=""/>
+        <p:cNvGrpSpPr/>
+        <p:nvPr/>
+      </p:nvGrpSpPr>
+      <p:grpSpPr>
+        <a:xfrm>
+          <a:off x="0" y="0"/>
+          <a:ext cx="0" cy="0"/>
+          <a:chOff x="0" y="0"/>
+          <a:chExt cx="0" cy="0"/>
+        </a:xfrm>
+      </p:grpSpPr>
+      <p:sp>
+        <p:nvSpPr>
+          <p:cNvPr id="187" name="TextShape 1"/>
+          <p:cNvSpPr txBox="1"/>
+          <p:nvPr/>
+        </p:nvSpPr>
+        <p:spPr>
+          <a:xfrm>
+            <a:off x="503640" y="301680"/>
+            <a:ext cx="9069120" cy="1262520"/>
+          </a:xfrm>
+          <a:prstGeom prst="rect">
+            <a:avLst/>
+          </a:prstGeom>
+          <a:noFill/>
+          <a:ln>
+            <a:noFill/>
+          </a:ln>
+        </p:spPr>
+        <p:txBody>
+          <a:bodyPr lIns="0" rIns="0" tIns="0" bIns="0" anchor="ctr">
+            <a:noAutofit/>
+          </a:bodyPr>
+          <a:p>
+            <a:pPr algn="ctr"/>
+            <a:r>
+              <a:rPr b="0" i="1" lang="en-US" sz="4400" spc="-1" strike="noStrike">
+                <a:solidFill>
+                  <a:srgbClr val="ffffff"/>
+                </a:solidFill>
+                <a:latin typeface="Arial"/>
+              </a:rPr>
+              <a:t>Poziv servisa</a:t>
+            </a:r>
+            <a:endParaRPr b="0" i="1" lang="en-US" sz="4400" spc="-1" strike="noStrike">
+              <a:solidFill>
+                <a:srgbClr val="ffffff"/>
+              </a:solidFill>
+              <a:latin typeface="Arial"/>
+            </a:endParaRPr>
+          </a:p>
+        </p:txBody>
+      </p:sp>
+      <p:sp>
+        <p:nvSpPr>
+          <p:cNvPr id="188" name="TextShape 2"/>
+          <p:cNvSpPr txBox="1"/>
+          <p:nvPr/>
+        </p:nvSpPr>
+        <p:spPr>
+          <a:xfrm>
+            <a:off x="503640" y="1769400"/>
+            <a:ext cx="9069120" cy="4385880"/>
+          </a:xfrm>
+          <a:prstGeom prst="rect">
+            <a:avLst/>
+          </a:prstGeom>
+          <a:noFill/>
+          <a:ln>
+            <a:noFill/>
+          </a:ln>
+        </p:spPr>
+        <p:txBody>
+          <a:bodyPr lIns="0" rIns="0" tIns="0" bIns="0">
+            <a:normAutofit fontScale="63000"/>
+          </a:bodyPr>
+          <a:p>
+            <a:pPr marL="432000" indent="-324000">
+              <a:spcBef>
+                <a:spcPts val="1417"/>
+              </a:spcBef>
+              <a:buClr>
+                <a:srgbClr val="000000"/>
+              </a:buClr>
+              <a:buSzPct val="45000"/>
+              <a:buFont typeface="Wingdings" charset="2"/>
+              <a:buChar char=""/>
+            </a:pPr>
+            <a:r>
+              <a:rPr b="0" lang="en-US" sz="3200" spc="-1" strike="noStrike">
+                <a:latin typeface="Arial"/>
+              </a:rPr>
+              <a:t>Preko CLI (list, get, call)</a:t>
+            </a:r>
+            <a:endParaRPr b="0" lang="en-US" sz="3200" spc="-1" strike="noStrike">
+              <a:latin typeface="Arial"/>
+            </a:endParaRPr>
+          </a:p>
+          <a:p>
+            <a:pPr marL="432000" indent="-324000">
+              <a:spcBef>
+                <a:spcPts val="1417"/>
+              </a:spcBef>
+              <a:buClr>
+                <a:srgbClr val="000000"/>
+              </a:buClr>
+              <a:buSzPct val="45000"/>
+              <a:buFont typeface="Wingdings" charset="2"/>
+              <a:buChar char=""/>
+            </a:pPr>
+            <a:r>
+              <a:rPr b="0" lang="en-US" sz="3200" spc="-1" strike="noStrike">
+                <a:latin typeface="Arial"/>
+              </a:rPr>
+              <a:t>Preko Micro Weba</a:t>
+            </a:r>
+            <a:endParaRPr b="0" lang="en-US" sz="3200" spc="-1" strike="noStrike">
+              <a:latin typeface="Arial"/>
+            </a:endParaRPr>
+          </a:p>
+          <a:p>
+            <a:pPr marL="432000" indent="-324000">
+              <a:spcBef>
+                <a:spcPts val="1417"/>
+              </a:spcBef>
+              <a:buClr>
+                <a:srgbClr val="000000"/>
+              </a:buClr>
+              <a:buSzPct val="45000"/>
+              <a:buFont typeface="Wingdings" charset="2"/>
+              <a:buChar char=""/>
+            </a:pPr>
+            <a:endParaRPr b="0" lang="en-US" sz="3200" spc="-1" strike="noStrike">
+              <a:latin typeface="Arial"/>
+            </a:endParaRPr>
+          </a:p>
+          <a:p>
+            <a:pPr marL="432000" indent="-324000">
+              <a:spcBef>
+                <a:spcPts val="1417"/>
+              </a:spcBef>
+              <a:buClr>
+                <a:srgbClr val="000000"/>
+              </a:buClr>
+              <a:buSzPct val="45000"/>
+              <a:buFont typeface="Wingdings" charset="2"/>
+              <a:buChar char=""/>
+            </a:pPr>
+            <a:endParaRPr b="0" lang="en-US" sz="3200" spc="-1" strike="noStrike">
+              <a:latin typeface="Arial"/>
+            </a:endParaRPr>
+          </a:p>
+          <a:p>
+            <a:pPr marL="432000" indent="-324000">
+              <a:spcBef>
+                <a:spcPts val="1417"/>
+              </a:spcBef>
+              <a:buClr>
+                <a:srgbClr val="000000"/>
+              </a:buClr>
+              <a:buSzPct val="45000"/>
+              <a:buFont typeface="Wingdings" charset="2"/>
+              <a:buChar char=""/>
+            </a:pPr>
+            <a:endParaRPr b="0" lang="en-US" sz="3200" spc="-1" strike="noStrike">
+              <a:latin typeface="Arial"/>
+            </a:endParaRPr>
+          </a:p>
+          <a:p>
+            <a:pPr marL="432000" indent="-324000">
+              <a:spcBef>
+                <a:spcPts val="1417"/>
+              </a:spcBef>
+              <a:buClr>
+                <a:srgbClr val="000000"/>
+              </a:buClr>
+              <a:buSzPct val="45000"/>
+              <a:buFont typeface="Wingdings" charset="2"/>
+              <a:buChar char=""/>
+            </a:pPr>
+            <a:r>
+              <a:rPr b="0" lang="en-US" sz="3200" spc="-1" strike="noStrike">
+                <a:latin typeface="Arial"/>
+              </a:rPr>
+              <a:t>Kroz kod</a:t>
+            </a:r>
+            <a:endParaRPr b="0" lang="en-US" sz="3200" spc="-1" strike="noStrike">
+              <a:latin typeface="Arial"/>
+            </a:endParaRPr>
+          </a:p>
+          <a:p>
+            <a:pPr lvl="1" marL="864000" indent="-324000">
+              <a:spcBef>
+                <a:spcPts val="1134"/>
+              </a:spcBef>
+              <a:buClr>
+                <a:srgbClr val="000000"/>
+              </a:buClr>
+              <a:buSzPct val="75000"/>
+              <a:buFont typeface="Symbol" charset="2"/>
+              <a:buChar char=""/>
+            </a:pPr>
+            <a:r>
+              <a:rPr b="0" lang="en-US" sz="2800" spc="-1" strike="noStrike">
+                <a:latin typeface="Arial"/>
+              </a:rPr>
+              <a:t>helloClient := hello.NewHelloService("com.foo.srv.hello", service.Client())</a:t>
+            </a:r>
+            <a:endParaRPr b="0" lang="en-US" sz="2800" spc="-1" strike="noStrike">
+              <a:latin typeface="Arial"/>
+            </a:endParaRPr>
+          </a:p>
+          <a:p>
+            <a:pPr lvl="1" marL="864000" indent="-324000">
+              <a:spcBef>
+                <a:spcPts val="1134"/>
+              </a:spcBef>
+              <a:buClr>
+                <a:srgbClr val="000000"/>
+              </a:buClr>
+              <a:buSzPct val="75000"/>
+              <a:buFont typeface="Symbol" charset="2"/>
+              <a:buChar char=""/>
+            </a:pPr>
+            <a:r>
+              <a:rPr b="0" lang="en-US" sz="2800" spc="-1" strike="noStrike">
+                <a:latin typeface="Arial"/>
+              </a:rPr>
+              <a:t>resp, err := helloClient.Helloo(context.TODO(), &amp;hello.Request { Name: "World"}) </a:t>
+            </a:r>
+            <a:endParaRPr b="0" lang="en-US" sz="2800" spc="-1" strike="noStrike">
+              <a:latin typeface="Arial"/>
+            </a:endParaRPr>
+          </a:p>
+        </p:txBody>
+      </p:sp>
+      <p:pic>
+        <p:nvPicPr>
+          <p:cNvPr id="189" name="" descr=""/>
+          <p:cNvPicPr/>
+          <p:nvPr/>
+        </p:nvPicPr>
+        <p:blipFill>
+          <a:blip r:embed="rId1"/>
+          <a:stretch/>
+        </p:blipFill>
+        <p:spPr>
+          <a:xfrm>
+            <a:off x="5577840" y="1768320"/>
+            <a:ext cx="4263480" cy="2803680"/>
+          </a:xfrm>
+          <a:prstGeom prst="rect">
+            <a:avLst/>
+          </a:prstGeom>
+          <a:ln>
+            <a:noFill/>
+          </a:ln>
+        </p:spPr>
+      </p:pic>
+    </p:spTree>
+  </p:cSld>
+  <mc:AlternateContent>
+    <mc:Choice Requires="p14">
+      <p:transition spd="slow" p14:dur="2000"/>
+    </mc:Choice>
+    <mc:Fallback>
+      <p:transition spd="slow"/>
+    </mc:Fallback>
+  </mc:AlternateContent>
+</p:sld>
+</file>
+
+<file path=ppt/slides/slide15.xml><?xml version="1.0" encoding="utf-8"?>
+<p:sld xmlns:a="http://schemas.openxmlformats.org/drawingml/2006/main" xmlns:p="http://schemas.openxmlformats.org/presentationml/2006/main" xmlns:r="http://schemas.openxmlformats.org/officeDocument/2006/relationships" xmlns:p14="http://schemas.microsoft.com/office/powerpoint/2010/main" xmlns:p15="http://schemas.microsoft.com/office/powerpoint/2012/main" xmlns:mc="http://schemas.openxmlformats.org/markup-compatibility/2006">
+  <p:cSld>
+    <p:spTree>
+      <p:nvGrpSpPr>
+        <p:cNvPr id="1" name=""/>
+        <p:cNvGrpSpPr/>
+        <p:nvPr/>
+      </p:nvGrpSpPr>
+      <p:grpSpPr>
+        <a:xfrm>
+          <a:off x="0" y="0"/>
+          <a:ext cx="0" cy="0"/>
+          <a:chOff x="0" y="0"/>
+          <a:chExt cx="0" cy="0"/>
+        </a:xfrm>
+      </p:grpSpPr>
+      <p:sp>
+        <p:nvSpPr>
+          <p:cNvPr id="190" name="TextShape 1"/>
+          <p:cNvSpPr txBox="1"/>
+          <p:nvPr/>
+        </p:nvSpPr>
+        <p:spPr>
+          <a:xfrm>
+            <a:off x="503640" y="301680"/>
+            <a:ext cx="9069120" cy="1262520"/>
+          </a:xfrm>
+          <a:prstGeom prst="rect">
+            <a:avLst/>
+          </a:prstGeom>
+          <a:noFill/>
+          <a:ln>
+            <a:noFill/>
+          </a:ln>
+        </p:spPr>
+        <p:txBody>
+          <a:bodyPr lIns="0" rIns="0" tIns="0" bIns="0" anchor="ctr">
+            <a:noAutofit/>
+          </a:bodyPr>
+          <a:p>
+            <a:pPr algn="ctr"/>
+            <a:r>
+              <a:rPr b="0" i="1" lang="en-US" sz="4400" spc="-1" strike="noStrike">
+                <a:solidFill>
+                  <a:srgbClr val="ffffff"/>
+                </a:solidFill>
+                <a:latin typeface="Arial"/>
+              </a:rPr>
+              <a:t>Plugins</a:t>
+            </a:r>
+            <a:endParaRPr b="0" i="1" lang="en-US" sz="4400" spc="-1" strike="noStrike">
+              <a:solidFill>
+                <a:srgbClr val="ffffff"/>
+              </a:solidFill>
+              <a:latin typeface="Arial"/>
+            </a:endParaRPr>
+          </a:p>
+        </p:txBody>
+      </p:sp>
+      <p:sp>
+        <p:nvSpPr>
+          <p:cNvPr id="191" name="TextShape 2"/>
+          <p:cNvSpPr txBox="1"/>
+          <p:nvPr/>
+        </p:nvSpPr>
+        <p:spPr>
+          <a:xfrm>
+            <a:off x="0" y="2011680"/>
+            <a:ext cx="5943960" cy="3566160"/>
+          </a:xfrm>
+          <a:prstGeom prst="rect">
+            <a:avLst/>
+          </a:prstGeom>
+          <a:noFill/>
+          <a:ln>
+            <a:noFill/>
+          </a:ln>
+        </p:spPr>
+        <p:txBody>
+          <a:bodyPr lIns="0" rIns="0" tIns="0" bIns="0">
+            <a:normAutofit/>
+          </a:bodyPr>
+          <a:p>
+            <a:pPr marL="432000" indent="-324000">
+              <a:spcBef>
+                <a:spcPts val="1417"/>
+              </a:spcBef>
+              <a:buClr>
+                <a:srgbClr val="000000"/>
+              </a:buClr>
+              <a:buSzPct val="45000"/>
+              <a:buFont typeface="Wingdings" charset="2"/>
+              <a:buChar char=""/>
+            </a:pPr>
+            <a:r>
+              <a:rPr b="0" lang="en-US" sz="2800" spc="-1" strike="noStrike">
+                <a:latin typeface="Arial"/>
+              </a:rPr>
+              <a:t>Da bi zamenili jednu od komponeti micro moramo da uradimo sledece:</a:t>
+            </a:r>
+            <a:endParaRPr b="0" lang="en-US" sz="2800" spc="-1" strike="noStrike">
+              <a:latin typeface="Arial"/>
+            </a:endParaRPr>
+          </a:p>
+          <a:p>
+            <a:pPr lvl="1" marL="864000" indent="-324000">
+              <a:spcBef>
+                <a:spcPts val="1134"/>
+              </a:spcBef>
+              <a:buClr>
+                <a:srgbClr val="000000"/>
+              </a:buClr>
+              <a:buSzPct val="75000"/>
+              <a:buFont typeface="Symbol" charset="2"/>
+              <a:buChar char=""/>
+            </a:pPr>
+            <a:r>
+              <a:rPr b="0" lang="en-US" sz="2800" spc="-1" strike="noStrike">
+                <a:latin typeface="Arial"/>
+              </a:rPr>
+              <a:t>Importujemo odgovrajuci plugin</a:t>
+            </a:r>
+            <a:endParaRPr b="0" lang="en-US" sz="2800" spc="-1" strike="noStrike">
+              <a:latin typeface="Arial"/>
+            </a:endParaRPr>
+          </a:p>
+          <a:p>
+            <a:pPr lvl="1" marL="864000" indent="-324000">
+              <a:spcBef>
+                <a:spcPts val="1134"/>
+              </a:spcBef>
+              <a:buClr>
+                <a:srgbClr val="000000"/>
+              </a:buClr>
+              <a:buSzPct val="75000"/>
+              <a:buFont typeface="Symbol" charset="2"/>
+              <a:buChar char=""/>
+            </a:pPr>
+            <a:r>
+              <a:rPr b="0" lang="en-US" sz="2800" spc="-1" strike="noStrike">
+                <a:latin typeface="Arial"/>
+              </a:rPr>
+              <a:t>Kreiramo odgovarajuci plugin</a:t>
+            </a:r>
+            <a:endParaRPr b="0" lang="en-US" sz="2800" spc="-1" strike="noStrike">
+              <a:latin typeface="Arial"/>
+            </a:endParaRPr>
+          </a:p>
+          <a:p>
+            <a:pPr lvl="1" marL="864000" indent="-324000">
+              <a:spcBef>
+                <a:spcPts val="1134"/>
+              </a:spcBef>
+              <a:buClr>
+                <a:srgbClr val="000000"/>
+              </a:buClr>
+              <a:buSzPct val="75000"/>
+              <a:buFont typeface="Symbol" charset="2"/>
+              <a:buChar char=""/>
+            </a:pPr>
+            <a:r>
+              <a:rPr b="0" lang="en-US" sz="2800" spc="-1" strike="noStrike">
+                <a:latin typeface="Arial"/>
+              </a:rPr>
+              <a:t>Prosledimo plugin pri kreiranju servisa</a:t>
+            </a:r>
+            <a:endParaRPr b="0" lang="en-US" sz="2800" spc="-1" strike="noStrike">
+              <a:latin typeface="Arial"/>
+            </a:endParaRPr>
+          </a:p>
+        </p:txBody>
+      </p:sp>
+      <p:pic>
+        <p:nvPicPr>
+          <p:cNvPr id="192" name="" descr=""/>
+          <p:cNvPicPr/>
+          <p:nvPr/>
+        </p:nvPicPr>
+        <p:blipFill>
+          <a:blip r:embed="rId1"/>
+          <a:stretch/>
+        </p:blipFill>
+        <p:spPr>
+          <a:xfrm>
+            <a:off x="5943960" y="2011680"/>
+            <a:ext cx="4133520" cy="5038200"/>
+          </a:xfrm>
+          <a:prstGeom prst="rect">
+            <a:avLst/>
+          </a:prstGeom>
+          <a:ln>
+            <a:noFill/>
+          </a:ln>
+        </p:spPr>
+      </p:pic>
     </p:spTree>
   </p:cSld>
   <mc:AlternateContent>
@@ -8267,7 +9799,7 @@
         <p:spPr>
           <a:xfrm>
             <a:off x="503640" y="109440"/>
-            <a:ext cx="9066240" cy="1260720"/>
+            <a:ext cx="9065880" cy="1260360"/>
           </a:xfrm>
           <a:prstGeom prst="rect">
             <a:avLst/>
@@ -8318,7 +9850,7 @@
         <p:spPr>
           <a:xfrm>
             <a:off x="503640" y="2103480"/>
-            <a:ext cx="9066240" cy="4050000"/>
+            <a:ext cx="9065880" cy="4049640"/>
           </a:xfrm>
           <a:prstGeom prst="rect">
             <a:avLst/>
@@ -8339,7 +9871,7 @@
             <a:normAutofit/>
           </a:bodyPr>
           <a:p>
-            <a:pPr marL="432000" indent="-322200">
+            <a:pPr marL="432000" indent="-321840">
               <a:lnSpc>
                 <a:spcPct val="100000"/>
               </a:lnSpc>
@@ -8368,7 +9900,7 @@
             </a:endParaRPr>
           </a:p>
           <a:p>
-            <a:pPr marL="432000" indent="-322200">
+            <a:pPr marL="432000" indent="-321840">
               <a:lnSpc>
                 <a:spcPct val="100000"/>
               </a:lnSpc>
@@ -8397,7 +9929,7 @@
             </a:endParaRPr>
           </a:p>
           <a:p>
-            <a:pPr marL="432000" indent="-322200">
+            <a:pPr marL="432000" indent="-321840">
               <a:lnSpc>
                 <a:spcPct val="100000"/>
               </a:lnSpc>
@@ -8466,7 +9998,7 @@
         <p:spPr>
           <a:xfrm>
             <a:off x="533520" y="109440"/>
-            <a:ext cx="9066240" cy="1260720"/>
+            <a:ext cx="9065880" cy="1260360"/>
           </a:xfrm>
           <a:prstGeom prst="rect">
             <a:avLst/>
@@ -8517,7 +10049,7 @@
         <p:spPr>
           <a:xfrm>
             <a:off x="503640" y="1769400"/>
-            <a:ext cx="9066240" cy="5637600"/>
+            <a:ext cx="9065880" cy="5637240"/>
           </a:xfrm>
           <a:prstGeom prst="rect">
             <a:avLst/>
@@ -8538,7 +10070,7 @@
             <a:normAutofit fontScale="39000"/>
           </a:bodyPr>
           <a:p>
-            <a:pPr marL="432000" indent="-322200">
+            <a:pPr marL="432000" indent="-321840">
               <a:lnSpc>
                 <a:spcPct val="100000"/>
               </a:lnSpc>
@@ -8567,7 +10099,7 @@
             </a:endParaRPr>
           </a:p>
           <a:p>
-            <a:pPr marL="432000" indent="-322200">
+            <a:pPr marL="432000" indent="-321840">
               <a:lnSpc>
                 <a:spcPct val="100000"/>
               </a:lnSpc>
@@ -8596,7 +10128,7 @@
             </a:endParaRPr>
           </a:p>
           <a:p>
-            <a:pPr marL="432000" indent="-322200">
+            <a:pPr marL="432000" indent="-321840">
               <a:lnSpc>
                 <a:spcPct val="100000"/>
               </a:lnSpc>
@@ -8625,7 +10157,7 @@
             </a:endParaRPr>
           </a:p>
           <a:p>
-            <a:pPr marL="432000" indent="-322200">
+            <a:pPr marL="432000" indent="-321840">
               <a:lnSpc>
                 <a:spcPct val="100000"/>
               </a:lnSpc>
@@ -8654,7 +10186,7 @@
             </a:endParaRPr>
           </a:p>
           <a:p>
-            <a:pPr marL="432000" indent="-322200">
+            <a:pPr marL="432000" indent="-321840">
               <a:lnSpc>
                 <a:spcPct val="100000"/>
               </a:lnSpc>
@@ -8683,7 +10215,7 @@
             </a:endParaRPr>
           </a:p>
           <a:p>
-            <a:pPr marL="432000" indent="-322200">
+            <a:pPr marL="432000" indent="-321840">
               <a:lnSpc>
                 <a:spcPct val="100000"/>
               </a:lnSpc>
@@ -8712,7 +10244,7 @@
             </a:endParaRPr>
           </a:p>
           <a:p>
-            <a:pPr marL="432000" indent="-322200">
+            <a:pPr marL="432000" indent="-321840">
               <a:lnSpc>
                 <a:spcPct val="100000"/>
               </a:lnSpc>
@@ -8741,7 +10273,7 @@
             </a:endParaRPr>
           </a:p>
           <a:p>
-            <a:pPr marL="432000" indent="-322200">
+            <a:pPr marL="432000" indent="-321840">
               <a:lnSpc>
                 <a:spcPct val="100000"/>
               </a:lnSpc>
@@ -8810,7 +10342,7 @@
         <p:spPr>
           <a:xfrm>
             <a:off x="503640" y="109440"/>
-            <a:ext cx="9066240" cy="1260720"/>
+            <a:ext cx="9065880" cy="1260360"/>
           </a:xfrm>
           <a:prstGeom prst="rect">
             <a:avLst/>
@@ -8861,7 +10393,7 @@
         <p:spPr>
           <a:xfrm>
             <a:off x="456840" y="1925280"/>
-            <a:ext cx="9066240" cy="4384080"/>
+            <a:ext cx="9065880" cy="4383720"/>
           </a:xfrm>
           <a:prstGeom prst="rect">
             <a:avLst/>
@@ -8882,7 +10414,7 @@
             <a:normAutofit fontScale="42000"/>
           </a:bodyPr>
           <a:p>
-            <a:pPr marL="432000" indent="-322200">
+            <a:pPr marL="432000" indent="-321840">
               <a:lnSpc>
                 <a:spcPct val="100000"/>
               </a:lnSpc>
@@ -8911,7 +10443,7 @@
             </a:endParaRPr>
           </a:p>
           <a:p>
-            <a:pPr marL="432000" indent="-322200">
+            <a:pPr marL="432000" indent="-321840">
               <a:lnSpc>
                 <a:spcPct val="100000"/>
               </a:lnSpc>
@@ -8940,7 +10472,7 @@
             </a:endParaRPr>
           </a:p>
           <a:p>
-            <a:pPr marL="432000" indent="-322200">
+            <a:pPr marL="432000" indent="-321840">
               <a:lnSpc>
                 <a:spcPct val="100000"/>
               </a:lnSpc>
@@ -8969,7 +10501,7 @@
             </a:endParaRPr>
           </a:p>
           <a:p>
-            <a:pPr marL="432000" indent="-322200">
+            <a:pPr marL="432000" indent="-321840">
               <a:lnSpc>
                 <a:spcPct val="100000"/>
               </a:lnSpc>
@@ -8998,7 +10530,7 @@
             </a:endParaRPr>
           </a:p>
           <a:p>
-            <a:pPr marL="432000" indent="-322200">
+            <a:pPr marL="432000" indent="-321840">
               <a:lnSpc>
                 <a:spcPct val="100000"/>
               </a:lnSpc>
@@ -9027,7 +10559,7 @@
             </a:endParaRPr>
           </a:p>
           <a:p>
-            <a:pPr marL="432000" indent="-322200">
+            <a:pPr marL="432000" indent="-321840">
               <a:lnSpc>
                 <a:spcPct val="100000"/>
               </a:lnSpc>
@@ -9096,7 +10628,7 @@
         <p:spPr>
           <a:xfrm>
             <a:off x="533520" y="182880"/>
-            <a:ext cx="9066240" cy="1260720"/>
+            <a:ext cx="9065880" cy="1260360"/>
           </a:xfrm>
           <a:prstGeom prst="rect">
             <a:avLst/>
@@ -9151,7 +10683,7 @@
         <p:spPr>
           <a:xfrm>
             <a:off x="639720" y="2076480"/>
-            <a:ext cx="8851680" cy="4050000"/>
+            <a:ext cx="8851320" cy="4049640"/>
           </a:xfrm>
           <a:prstGeom prst="rect">
             <a:avLst/>
@@ -9205,7 +10737,7 @@
         <p:spPr>
           <a:xfrm>
             <a:off x="503640" y="109440"/>
-            <a:ext cx="9066240" cy="1260720"/>
+            <a:ext cx="9065880" cy="1260360"/>
           </a:xfrm>
           <a:prstGeom prst="rect">
             <a:avLst/>
@@ -9256,7 +10788,7 @@
         <p:spPr>
           <a:xfrm>
             <a:off x="182520" y="1920600"/>
-            <a:ext cx="9778320" cy="5207400"/>
+            <a:ext cx="9777960" cy="5207040"/>
           </a:xfrm>
           <a:prstGeom prst="rect">
             <a:avLst/>
@@ -9277,7 +10809,7 @@
             <a:normAutofit fontScale="84000"/>
           </a:bodyPr>
           <a:p>
-            <a:pPr marL="432000" indent="-322200">
+            <a:pPr marL="432000" indent="-321840">
               <a:lnSpc>
                 <a:spcPct val="100000"/>
               </a:lnSpc>
@@ -9306,7 +10838,7 @@
             </a:endParaRPr>
           </a:p>
           <a:p>
-            <a:pPr lvl="1" marL="864000" indent="-322200">
+            <a:pPr lvl="1" marL="864000" indent="-321840">
               <a:lnSpc>
                 <a:spcPct val="100000"/>
               </a:lnSpc>
@@ -9335,7 +10867,7 @@
             </a:endParaRPr>
           </a:p>
           <a:p>
-            <a:pPr lvl="1" marL="864000" indent="-322200">
+            <a:pPr lvl="1" marL="864000" indent="-321840">
               <a:lnSpc>
                 <a:spcPct val="100000"/>
               </a:lnSpc>
@@ -9364,7 +10896,7 @@
             </a:endParaRPr>
           </a:p>
           <a:p>
-            <a:pPr lvl="1" marL="864000" indent="-322200">
+            <a:pPr lvl="1" marL="864000" indent="-321840">
               <a:lnSpc>
                 <a:spcPct val="100000"/>
               </a:lnSpc>
@@ -9393,7 +10925,7 @@
             </a:endParaRPr>
           </a:p>
           <a:p>
-            <a:pPr lvl="1" marL="864000" indent="-322200">
+            <a:pPr lvl="1" marL="864000" indent="-321840">
               <a:lnSpc>
                 <a:spcPct val="100000"/>
               </a:lnSpc>
@@ -9422,7 +10954,7 @@
             </a:endParaRPr>
           </a:p>
           <a:p>
-            <a:pPr lvl="1" marL="864000" indent="-322200">
+            <a:pPr lvl="1" marL="864000" indent="-321840">
               <a:lnSpc>
                 <a:spcPct val="100000"/>
               </a:lnSpc>
@@ -9451,7 +10983,7 @@
             </a:endParaRPr>
           </a:p>
           <a:p>
-            <a:pPr lvl="1" marL="864000" indent="-322200">
+            <a:pPr lvl="1" marL="864000" indent="-321840">
               <a:lnSpc>
                 <a:spcPct val="100000"/>
               </a:lnSpc>
@@ -9480,7 +11012,7 @@
             </a:endParaRPr>
           </a:p>
           <a:p>
-            <a:pPr lvl="1" marL="864000" indent="-322200">
+            <a:pPr lvl="1" marL="864000" indent="-321840">
               <a:lnSpc>
                 <a:spcPct val="100000"/>
               </a:lnSpc>
@@ -9509,7 +11041,7 @@
             </a:endParaRPr>
           </a:p>
           <a:p>
-            <a:pPr lvl="1" marL="864000" indent="-322200">
+            <a:pPr lvl="1" marL="864000" indent="-321840">
               <a:lnSpc>
                 <a:spcPct val="100000"/>
               </a:lnSpc>
@@ -9538,7 +11070,7 @@
             </a:endParaRPr>
           </a:p>
           <a:p>
-            <a:pPr lvl="1" marL="864000" indent="-322200">
+            <a:pPr lvl="1" marL="864000" indent="-321840">
               <a:lnSpc>
                 <a:spcPct val="100000"/>
               </a:lnSpc>
@@ -9607,7 +11139,7 @@
         <p:spPr>
           <a:xfrm>
             <a:off x="503640" y="109440"/>
-            <a:ext cx="9066240" cy="1260720"/>
+            <a:ext cx="9065880" cy="1260360"/>
           </a:xfrm>
           <a:prstGeom prst="rect">
             <a:avLst/>
@@ -9658,7 +11190,7 @@
         <p:spPr>
           <a:xfrm>
             <a:off x="503640" y="1769400"/>
-            <a:ext cx="9066240" cy="4384080"/>
+            <a:ext cx="9065880" cy="4383720"/>
           </a:xfrm>
           <a:prstGeom prst="rect">
             <a:avLst/>
@@ -9679,7 +11211,7 @@
             <a:normAutofit/>
           </a:bodyPr>
           <a:p>
-            <a:pPr marL="432000" indent="-322200">
+            <a:pPr marL="432000" indent="-321840">
               <a:lnSpc>
                 <a:spcPct val="100000"/>
               </a:lnSpc>
@@ -9708,7 +11240,7 @@
             </a:endParaRPr>
           </a:p>
           <a:p>
-            <a:pPr lvl="1" marL="864000" indent="-322200">
+            <a:pPr lvl="1" marL="864000" indent="-321840">
               <a:lnSpc>
                 <a:spcPct val="100000"/>
               </a:lnSpc>
@@ -9730,14 +11262,14 @@
                 <a:latin typeface="Open Sans"/>
                 <a:ea typeface="DejaVu Sans"/>
               </a:rPr>
-              <a:t>Json</a:t>
+              <a:t>json</a:t>
             </a:r>
             <a:endParaRPr b="0" lang="en-US" sz="2800" spc="-1" strike="noStrike">
               <a:latin typeface="Arial"/>
             </a:endParaRPr>
           </a:p>
           <a:p>
-            <a:pPr lvl="1" marL="864000" indent="-322200">
+            <a:pPr lvl="1" marL="864000" indent="-321840">
               <a:lnSpc>
                 <a:spcPct val="100000"/>
               </a:lnSpc>
@@ -9759,14 +11291,14 @@
                 <a:latin typeface="Open Sans"/>
                 <a:ea typeface="DejaVu Sans"/>
               </a:rPr>
-              <a:t>Zaml</a:t>
+              <a:t>yaml</a:t>
             </a:r>
             <a:endParaRPr b="0" lang="en-US" sz="2800" spc="-1" strike="noStrike">
               <a:latin typeface="Arial"/>
             </a:endParaRPr>
           </a:p>
           <a:p>
-            <a:pPr lvl="1" marL="864000" indent="-322200">
+            <a:pPr lvl="1" marL="864000" indent="-321840">
               <a:lnSpc>
                 <a:spcPct val="100000"/>
               </a:lnSpc>
@@ -9788,14 +11320,14 @@
                 <a:latin typeface="Open Sans"/>
                 <a:ea typeface="DejaVu Sans"/>
               </a:rPr>
-              <a:t>Toml</a:t>
+              <a:t>toml</a:t>
             </a:r>
             <a:endParaRPr b="0" lang="en-US" sz="2800" spc="-1" strike="noStrike">
               <a:latin typeface="Arial"/>
             </a:endParaRPr>
           </a:p>
           <a:p>
-            <a:pPr lvl="1" marL="864000" indent="-322200">
+            <a:pPr lvl="1" marL="864000" indent="-321840">
               <a:lnSpc>
                 <a:spcPct val="100000"/>
               </a:lnSpc>
@@ -9817,14 +11349,14 @@
                 <a:latin typeface="Open Sans"/>
                 <a:ea typeface="DejaVu Sans"/>
               </a:rPr>
-              <a:t>Xml</a:t>
+              <a:t>xml</a:t>
             </a:r>
             <a:endParaRPr b="0" lang="en-US" sz="2800" spc="-1" strike="noStrike">
               <a:latin typeface="Arial"/>
             </a:endParaRPr>
           </a:p>
           <a:p>
-            <a:pPr lvl="1" marL="864000" indent="-322200">
+            <a:pPr lvl="1" marL="864000" indent="-321840">
               <a:lnSpc>
                 <a:spcPct val="100000"/>
               </a:lnSpc>
@@ -9846,7 +11378,7 @@
                 <a:latin typeface="Open Sans"/>
                 <a:ea typeface="DejaVu Sans"/>
               </a:rPr>
-              <a:t>Hcl</a:t>
+              <a:t>hcl</a:t>
             </a:r>
             <a:endParaRPr b="0" lang="en-US" sz="2800" spc="-1" strike="noStrike">
               <a:latin typeface="Arial"/>
@@ -9893,7 +11425,7 @@
         <p:spPr>
           <a:xfrm>
             <a:off x="503640" y="109440"/>
-            <a:ext cx="9066240" cy="1260720"/>
+            <a:ext cx="9065880" cy="1260360"/>
           </a:xfrm>
           <a:prstGeom prst="rect">
             <a:avLst/>
@@ -9944,7 +11476,7 @@
         <p:spPr>
           <a:xfrm>
             <a:off x="273960" y="1769400"/>
-            <a:ext cx="9295920" cy="5454720"/>
+            <a:ext cx="9295560" cy="5454360"/>
           </a:xfrm>
           <a:prstGeom prst="rect">
             <a:avLst/>
@@ -9965,7 +11497,7 @@
             <a:normAutofit/>
           </a:bodyPr>
           <a:p>
-            <a:pPr marL="432000" indent="-322200">
+            <a:pPr marL="432000" indent="-321840">
               <a:lnSpc>
                 <a:spcPct val="100000"/>
               </a:lnSpc>
@@ -9994,7 +11526,7 @@
             </a:endParaRPr>
           </a:p>
           <a:p>
-            <a:pPr lvl="1" marL="864000" indent="-322200">
+            <a:pPr lvl="1" marL="864000" indent="-321840">
               <a:lnSpc>
                 <a:spcPct val="100000"/>
               </a:lnSpc>
@@ -10023,7 +11555,7 @@
             </a:endParaRPr>
           </a:p>
           <a:p>
-            <a:pPr lvl="1" marL="864000" indent="-322200">
+            <a:pPr lvl="1" marL="864000" indent="-321840">
               <a:lnSpc>
                 <a:spcPct val="100000"/>
               </a:lnSpc>
@@ -10052,7 +11584,7 @@
             </a:endParaRPr>
           </a:p>
           <a:p>
-            <a:pPr lvl="1" marL="864000" indent="-322200">
+            <a:pPr lvl="1" marL="864000" indent="-321840">
               <a:lnSpc>
                 <a:spcPct val="100000"/>
               </a:lnSpc>
@@ -10081,7 +11613,7 @@
             </a:endParaRPr>
           </a:p>
           <a:p>
-            <a:pPr lvl="1" marL="864000" indent="-322200">
+            <a:pPr lvl="1" marL="864000" indent="-321840">
               <a:lnSpc>
                 <a:spcPct val="100000"/>
               </a:lnSpc>
@@ -10110,7 +11642,7 @@
             </a:endParaRPr>
           </a:p>
           <a:p>
-            <a:pPr lvl="1" marL="864000" indent="-322200">
+            <a:pPr lvl="1" marL="864000" indent="-321840">
               <a:lnSpc>
                 <a:spcPct val="100000"/>
               </a:lnSpc>
@@ -10139,7 +11671,7 @@
             </a:endParaRPr>
           </a:p>
           <a:p>
-            <a:pPr lvl="1" marL="864000" indent="-322200">
+            <a:pPr lvl="1" marL="864000" indent="-321840">
               <a:lnSpc>
                 <a:spcPct val="100000"/>
               </a:lnSpc>
@@ -10168,7 +11700,7 @@
             </a:endParaRPr>
           </a:p>
           <a:p>
-            <a:pPr lvl="1" marL="864000" indent="-322200">
+            <a:pPr lvl="1" marL="864000" indent="-321840">
               <a:lnSpc>
                 <a:spcPct val="100000"/>
               </a:lnSpc>
@@ -10197,7 +11729,7 @@
             </a:endParaRPr>
           </a:p>
           <a:p>
-            <a:pPr lvl="1" marL="864000" indent="-322200">
+            <a:pPr lvl="1" marL="864000" indent="-321840">
               <a:lnSpc>
                 <a:spcPct val="100000"/>
               </a:lnSpc>
@@ -10266,7 +11798,7 @@
         <p:spPr>
           <a:xfrm>
             <a:off x="503640" y="109440"/>
-            <a:ext cx="9066240" cy="1260720"/>
+            <a:ext cx="9065880" cy="1260360"/>
           </a:xfrm>
           <a:prstGeom prst="rect">
             <a:avLst/>
@@ -10317,7 +11849,7 @@
         <p:spPr>
           <a:xfrm>
             <a:off x="503640" y="1769400"/>
-            <a:ext cx="9066240" cy="4384080"/>
+            <a:ext cx="9065880" cy="4383720"/>
           </a:xfrm>
           <a:prstGeom prst="rect">
             <a:avLst/>
@@ -10338,7 +11870,7 @@
             <a:normAutofit/>
           </a:bodyPr>
           <a:p>
-            <a:pPr marL="432000" indent="-322200">
+            <a:pPr marL="432000" indent="-321840">
               <a:lnSpc>
                 <a:spcPct val="100000"/>
               </a:lnSpc>
@@ -10367,7 +11899,7 @@
             </a:endParaRPr>
           </a:p>
           <a:p>
-            <a:pPr lvl="1" marL="864000" indent="-322200">
+            <a:pPr lvl="1" marL="864000" indent="-321840">
               <a:lnSpc>
                 <a:spcPct val="100000"/>
               </a:lnSpc>
@@ -10396,7 +11928,7 @@
             </a:endParaRPr>
           </a:p>
           <a:p>
-            <a:pPr lvl="1" marL="864000" indent="-322200">
+            <a:pPr lvl="1" marL="864000" indent="-321840">
               <a:lnSpc>
                 <a:spcPct val="100000"/>
               </a:lnSpc>
@@ -10425,7 +11957,7 @@
             </a:endParaRPr>
           </a:p>
           <a:p>
-            <a:pPr lvl="1" marL="864000" indent="-322200">
+            <a:pPr lvl="1" marL="864000" indent="-321840">
               <a:lnSpc>
                 <a:spcPct val="100000"/>
               </a:lnSpc>
@@ -10454,7 +11986,7 @@
             </a:endParaRPr>
           </a:p>
           <a:p>
-            <a:pPr lvl="1" marL="864000" indent="-322200">
+            <a:pPr lvl="1" marL="864000" indent="-321840">
               <a:lnSpc>
                 <a:spcPct val="100000"/>
               </a:lnSpc>
@@ -10483,7 +12015,7 @@
             </a:endParaRPr>
           </a:p>
           <a:p>
-            <a:pPr lvl="1" marL="864000" indent="-322200">
+            <a:pPr lvl="1" marL="864000" indent="-321840">
               <a:lnSpc>
                 <a:spcPct val="100000"/>
               </a:lnSpc>

</xml_diff>